<commit_message>
Added demos and edited presentation
</commit_message>
<xml_diff>
--- a/Presentations/Enhanced intrusion detection system with deep learning.pptx
+++ b/Presentations/Enhanced intrusion detection system with deep learning.pptx
@@ -5,7 +5,7 @@
     <p:sldMasterId id="2147483648" r:id="rId1"/>
   </p:sldMasterIdLst>
   <p:notesMasterIdLst>
-    <p:notesMasterId r:id="rId22"/>
+    <p:notesMasterId r:id="rId26"/>
   </p:notesMasterIdLst>
   <p:sldIdLst>
     <p:sldId id="256" r:id="rId2"/>
@@ -21,13 +21,17 @@
     <p:sldId id="272" r:id="rId12"/>
     <p:sldId id="276" r:id="rId13"/>
     <p:sldId id="273" r:id="rId14"/>
-    <p:sldId id="277" r:id="rId15"/>
-    <p:sldId id="278" r:id="rId16"/>
-    <p:sldId id="279" r:id="rId17"/>
-    <p:sldId id="280" r:id="rId18"/>
-    <p:sldId id="281" r:id="rId19"/>
-    <p:sldId id="274" r:id="rId20"/>
-    <p:sldId id="269" r:id="rId21"/>
+    <p:sldId id="280" r:id="rId15"/>
+    <p:sldId id="281" r:id="rId16"/>
+    <p:sldId id="282" r:id="rId17"/>
+    <p:sldId id="274" r:id="rId18"/>
+    <p:sldId id="284" r:id="rId19"/>
+    <p:sldId id="285" r:id="rId20"/>
+    <p:sldId id="277" r:id="rId21"/>
+    <p:sldId id="278" r:id="rId22"/>
+    <p:sldId id="279" r:id="rId23"/>
+    <p:sldId id="283" r:id="rId24"/>
+    <p:sldId id="269" r:id="rId25"/>
   </p:sldIdLst>
   <p:sldSz cx="12192000" cy="6858000"/>
   <p:notesSz cx="6858000" cy="9144000"/>
@@ -216,7 +220,7 @@
           <a:p>
             <a:fld id="{71A0A62B-EE20-4689-94CE-2AF98C4C2EC0}" type="datetimeFigureOut">
               <a:rPr lang="en-US" smtClean="0"/>
-              <a:t>09-Oct-20</a:t>
+              <a:t>31-Oct-20</a:t>
             </a:fld>
             <a:endParaRPr lang="en-US"/>
           </a:p>
@@ -652,7 +656,7 @@
           <a:p>
             <a:fld id="{ED365870-E4A6-439F-A661-37324C4E2F68}" type="datetime1">
               <a:rPr lang="en-US" smtClean="0"/>
-              <a:t>09-Oct-20</a:t>
+              <a:t>31-Oct-20</a:t>
             </a:fld>
             <a:endParaRPr lang="en-US" dirty="0"/>
           </a:p>
@@ -978,7 +982,7 @@
           <a:p>
             <a:fld id="{5240EBEC-16B0-423B-ACAB-7AA585B105BB}" type="datetime1">
               <a:rPr lang="en-US" smtClean="0"/>
-              <a:t>09-Oct-20</a:t>
+              <a:t>31-Oct-20</a:t>
             </a:fld>
             <a:endParaRPr lang="en-US" dirty="0"/>
           </a:p>
@@ -1153,7 +1157,7 @@
           <a:p>
             <a:fld id="{84023D3B-A34A-4D01-A451-623308F1E8AF}" type="datetime1">
               <a:rPr lang="en-US" smtClean="0"/>
-              <a:t>09-Oct-20</a:t>
+              <a:t>31-Oct-20</a:t>
             </a:fld>
             <a:endParaRPr lang="en-US" dirty="0"/>
           </a:p>
@@ -1318,7 +1322,7 @@
           <a:p>
             <a:fld id="{F959EB48-03C4-4E77-B9CD-CAFBA125CA47}" type="datetime1">
               <a:rPr lang="en-US" smtClean="0"/>
-              <a:t>09-Oct-20</a:t>
+              <a:t>31-Oct-20</a:t>
             </a:fld>
             <a:endParaRPr lang="en-US" dirty="0"/>
           </a:p>
@@ -1590,7 +1594,7 @@
           <a:p>
             <a:fld id="{DAC69241-3748-4DAD-9256-A9304E3BDAAB}" type="datetime1">
               <a:rPr lang="en-US" smtClean="0"/>
-              <a:t>09-Oct-20</a:t>
+              <a:t>31-Oct-20</a:t>
             </a:fld>
             <a:endParaRPr lang="en-US" dirty="0"/>
           </a:p>
@@ -1980,7 +1984,7 @@
           <a:p>
             <a:fld id="{177D280C-E99B-423D-877F-B0382A500513}" type="datetime1">
               <a:rPr lang="en-US" smtClean="0"/>
-              <a:t>09-Oct-20</a:t>
+              <a:t>31-Oct-20</a:t>
             </a:fld>
             <a:endParaRPr lang="en-US" dirty="0"/>
           </a:p>
@@ -2452,7 +2456,7 @@
           <a:p>
             <a:fld id="{D55E2FFC-71AA-42F9-8268-2940B7BF028E}" type="datetime1">
               <a:rPr lang="en-US" smtClean="0"/>
-              <a:t>09-Oct-20</a:t>
+              <a:t>31-Oct-20</a:t>
             </a:fld>
             <a:endParaRPr lang="en-US" dirty="0"/>
           </a:p>
@@ -2565,7 +2569,7 @@
           <a:p>
             <a:fld id="{1F58221D-F540-4719-B2E7-77C9E34B1CF4}" type="datetime1">
               <a:rPr lang="en-US" smtClean="0"/>
-              <a:t>09-Oct-20</a:t>
+              <a:t>31-Oct-20</a:t>
             </a:fld>
             <a:endParaRPr lang="en-US" dirty="0"/>
           </a:p>
@@ -2655,7 +2659,7 @@
           <a:p>
             <a:fld id="{2B624B6C-BE07-42FE-8DEB-140E478A2B38}" type="datetime1">
               <a:rPr lang="en-US" smtClean="0"/>
-              <a:t>09-Oct-20</a:t>
+              <a:t>31-Oct-20</a:t>
             </a:fld>
             <a:endParaRPr lang="en-US" dirty="0"/>
           </a:p>
@@ -2996,7 +3000,7 @@
           <a:p>
             <a:fld id="{3D806B12-D7AC-48C4-B044-84C4518B5C57}" type="datetime1">
               <a:rPr lang="en-US" smtClean="0"/>
-              <a:t>09-Oct-20</a:t>
+              <a:t>31-Oct-20</a:t>
             </a:fld>
             <a:endParaRPr lang="en-US" dirty="0"/>
           </a:p>
@@ -3380,7 +3384,7 @@
           <a:p>
             <a:fld id="{0B34C560-63BA-4AC9-A0F7-85224C8695D0}" type="datetime1">
               <a:rPr lang="en-US" smtClean="0"/>
-              <a:t>09-Oct-20</a:t>
+              <a:t>31-Oct-20</a:t>
             </a:fld>
             <a:endParaRPr lang="en-US" dirty="0"/>
           </a:p>
@@ -3654,7 +3658,7 @@
           <a:p>
             <a:fld id="{4A49D03B-EF1F-4F7D-9A05-4423BC9EAA24}" type="datetime1">
               <a:rPr lang="en-US" smtClean="0"/>
-              <a:t>09-Oct-20</a:t>
+              <a:t>31-Oct-20</a:t>
             </a:fld>
             <a:endParaRPr lang="en-US" dirty="0"/>
           </a:p>
@@ -4215,7 +4219,7 @@
         </p:spPr>
         <p:txBody>
           <a:bodyPr>
-            <a:normAutofit/>
+            <a:normAutofit fontScale="85000" lnSpcReduction="20000"/>
           </a:bodyPr>
           <a:lstStyle/>
           <a:p>
@@ -4227,7 +4231,13 @@
           <a:p>
             <a:r>
               <a:rPr lang="en-US" dirty="0"/>
-              <a:t>Supervised by: Dr. Ayman Ezzat</a:t>
+              <a:t>ID: 180879</a:t>
+            </a:r>
+          </a:p>
+          <a:p>
+            <a:r>
+              <a:rPr lang="en-US" dirty="0"/>
+              <a:t>Supervised by: Dr. Ayman Ezzat, Eng. Ahmed Neil</a:t>
             </a:r>
           </a:p>
         </p:txBody>
@@ -4254,8 +4264,8 @@
         </p:blipFill>
         <p:spPr>
           <a:xfrm>
-            <a:off x="9463005" y="161750"/>
-            <a:ext cx="1626704" cy="1626704"/>
+            <a:off x="8467946" y="112249"/>
+            <a:ext cx="1725703" cy="1725703"/>
           </a:xfrm>
           <a:prstGeom prst="rect">
             <a:avLst/>
@@ -4293,7 +4303,7 @@
             <a:pPr algn="ctr"/>
             <a:r>
               <a:rPr lang="en-US" sz="1400" dirty="0"/>
-              <a:t>20, July 2020</a:t>
+              <a:t>31, Oct 2020</a:t>
             </a:r>
           </a:p>
         </p:txBody>
@@ -4352,6 +4362,66 @@
           <a:xfrm>
             <a:off x="1212669" y="2901721"/>
             <a:ext cx="1947687" cy="1596465"/>
+          </a:xfrm>
+          <a:prstGeom prst="rect">
+            <a:avLst/>
+          </a:prstGeom>
+        </p:spPr>
+      </p:pic>
+      <p:pic>
+        <p:nvPicPr>
+          <p:cNvPr id="4" name="Picture 3">
+            <a:extLst>
+              <a:ext uri="{FF2B5EF4-FFF2-40B4-BE49-F238E27FC236}">
+                <a16:creationId xmlns:a16="http://schemas.microsoft.com/office/drawing/2014/main" id="{89735604-3490-42E1-B04F-27A694F292ED}"/>
+              </a:ext>
+            </a:extLst>
+          </p:cNvPr>
+          <p:cNvPicPr>
+            <a:picLocks noChangeAspect="1"/>
+          </p:cNvPicPr>
+          <p:nvPr/>
+        </p:nvPicPr>
+        <p:blipFill>
+          <a:blip r:embed="rId4"/>
+          <a:stretch>
+            <a:fillRect/>
+          </a:stretch>
+        </p:blipFill>
+        <p:spPr>
+          <a:xfrm>
+            <a:off x="10094651" y="418110"/>
+            <a:ext cx="1332324" cy="1113983"/>
+          </a:xfrm>
+          <a:prstGeom prst="rect">
+            <a:avLst/>
+          </a:prstGeom>
+        </p:spPr>
+      </p:pic>
+      <p:pic>
+        <p:nvPicPr>
+          <p:cNvPr id="9" name="Picture 8" descr="A picture containing building, drawing&#10;&#10;Description automatically generated">
+            <a:extLst>
+              <a:ext uri="{FF2B5EF4-FFF2-40B4-BE49-F238E27FC236}">
+                <a16:creationId xmlns:a16="http://schemas.microsoft.com/office/drawing/2014/main" id="{B8B637E1-3AB0-4B82-9137-998AEF2998A4}"/>
+              </a:ext>
+            </a:extLst>
+          </p:cNvPr>
+          <p:cNvPicPr>
+            <a:picLocks noChangeAspect="1"/>
+          </p:cNvPicPr>
+          <p:nvPr/>
+        </p:nvPicPr>
+        <p:blipFill>
+          <a:blip r:embed="rId5"/>
+          <a:stretch>
+            <a:fillRect/>
+          </a:stretch>
+        </p:blipFill>
+        <p:spPr>
+          <a:xfrm>
+            <a:off x="9164522" y="4753726"/>
+            <a:ext cx="1771658" cy="708663"/>
           </a:xfrm>
           <a:prstGeom prst="rect">
             <a:avLst/>
@@ -4416,7 +4486,7 @@
           <a:p>
             <a:r>
               <a:rPr lang="en-US" dirty="0"/>
-              <a:t>Data Collection</a:t>
+              <a:t>Input</a:t>
             </a:r>
           </a:p>
         </p:txBody>
@@ -5160,7 +5230,19 @@
           <a:p>
             <a:r>
               <a:rPr lang="en-US" sz="2400" dirty="0"/>
-              <a:t>Finding categorical features</a:t>
+              <a:t>Normalization of Highly-Variant Data</a:t>
+            </a:r>
+          </a:p>
+          <a:p>
+            <a:r>
+              <a:rPr lang="en-US" sz="2400" dirty="0"/>
+              <a:t>Feature Selection</a:t>
+            </a:r>
+          </a:p>
+          <a:p>
+            <a:r>
+              <a:rPr lang="en-US" sz="2400" dirty="0"/>
+              <a:t>Label Encoding of Categorical Features</a:t>
             </a:r>
           </a:p>
           <a:p>
@@ -5168,17 +5250,6 @@
               <a:rPr lang="en-US" sz="2400" dirty="0"/>
               <a:t>Visualization &amp; data correlation</a:t>
             </a:r>
-          </a:p>
-          <a:p>
-            <a:r>
-              <a:rPr lang="en-US" sz="2400" dirty="0"/>
-              <a:t>Feature mapping</a:t>
-            </a:r>
-          </a:p>
-          <a:p>
-            <a:pPr marL="0" indent="0">
-              <a:buNone/>
-            </a:pPr>
             <a:endParaRPr lang="en-US" dirty="0"/>
           </a:p>
           <a:p>
@@ -5273,7 +5344,7 @@
           <a:p>
             <a:r>
               <a:rPr lang="en-US" dirty="0"/>
-              <a:t>Pre-processing (cont.):</a:t>
+              <a:t>Input (cont.):</a:t>
             </a:r>
           </a:p>
         </p:txBody>
@@ -5314,12 +5385,8 @@
           <a:p>
             <a:pPr lvl="1"/>
             <a:r>
-              <a:rPr lang="en-US" sz="2600" dirty="0" err="1"/>
-              <a:t>Numericalization</a:t>
-            </a:r>
-            <a:r>
               <a:rPr lang="en-US" sz="2600" dirty="0"/>
-              <a:t> of categorical data (label/one-hot encoding)</a:t>
+              <a:t>Numericalization of categorical data (label/one-hot encoding)</a:t>
             </a:r>
           </a:p>
           <a:p>
@@ -5482,7 +5549,7 @@
         </p:nvSpPr>
         <p:spPr>
           <a:xfrm>
-            <a:off x="1371600" y="1598212"/>
+            <a:off x="1371600" y="1963172"/>
             <a:ext cx="4599830" cy="2931656"/>
           </a:xfrm>
         </p:spPr>
@@ -5498,6 +5565,12 @@
           <a:p>
             <a:r>
               <a:rPr lang="en-US" sz="2400" dirty="0"/>
+              <a:t>Random Forest</a:t>
+            </a:r>
+          </a:p>
+          <a:p>
+            <a:r>
+              <a:rPr lang="en-US" sz="2400" dirty="0"/>
               <a:t>SVM</a:t>
             </a:r>
           </a:p>
@@ -5508,6 +5581,9 @@
             </a:r>
           </a:p>
           <a:p>
+            <a:pPr marL="0" indent="0">
+              <a:buNone/>
+            </a:pPr>
             <a:endParaRPr lang="en-US" dirty="0"/>
           </a:p>
         </p:txBody>
@@ -5538,101 +5614,6 @@
               <a:t>13</a:t>
             </a:fld>
             <a:endParaRPr lang="en-US" dirty="0"/>
-          </a:p>
-        </p:txBody>
-      </p:sp>
-      <p:pic>
-        <p:nvPicPr>
-          <p:cNvPr id="5" name="Picture 4">
-            <a:extLst>
-              <a:ext uri="{FF2B5EF4-FFF2-40B4-BE49-F238E27FC236}">
-                <a16:creationId xmlns:a16="http://schemas.microsoft.com/office/drawing/2014/main" id="{EFFB86F1-B268-464B-B6B9-A0C191177001}"/>
-              </a:ext>
-            </a:extLst>
-          </p:cNvPr>
-          <p:cNvPicPr>
-            <a:picLocks noChangeAspect="1"/>
-          </p:cNvPicPr>
-          <p:nvPr/>
-        </p:nvPicPr>
-        <p:blipFill>
-          <a:blip r:embed="rId2"/>
-          <a:stretch>
-            <a:fillRect/>
-          </a:stretch>
-        </p:blipFill>
-        <p:spPr>
-          <a:xfrm>
-            <a:off x="7571635" y="2309353"/>
-            <a:ext cx="4199145" cy="2147654"/>
-          </a:xfrm>
-          <a:prstGeom prst="rect">
-            <a:avLst/>
-          </a:prstGeom>
-        </p:spPr>
-      </p:pic>
-      <p:pic>
-        <p:nvPicPr>
-          <p:cNvPr id="6" name="Picture 5">
-            <a:extLst>
-              <a:ext uri="{FF2B5EF4-FFF2-40B4-BE49-F238E27FC236}">
-                <a16:creationId xmlns:a16="http://schemas.microsoft.com/office/drawing/2014/main" id="{21C77B77-23A8-417E-A22D-08FFEC30B984}"/>
-              </a:ext>
-            </a:extLst>
-          </p:cNvPr>
-          <p:cNvPicPr>
-            <a:picLocks noChangeAspect="1"/>
-          </p:cNvPicPr>
-          <p:nvPr/>
-        </p:nvPicPr>
-        <p:blipFill>
-          <a:blip r:embed="rId3"/>
-          <a:stretch>
-            <a:fillRect/>
-          </a:stretch>
-        </p:blipFill>
-        <p:spPr>
-          <a:xfrm>
-            <a:off x="8955504" y="4620345"/>
-            <a:ext cx="2815276" cy="484228"/>
-          </a:xfrm>
-          <a:prstGeom prst="rect">
-            <a:avLst/>
-          </a:prstGeom>
-        </p:spPr>
-      </p:pic>
-      <p:sp>
-        <p:nvSpPr>
-          <p:cNvPr id="7" name="TextBox 6">
-            <a:extLst>
-              <a:ext uri="{FF2B5EF4-FFF2-40B4-BE49-F238E27FC236}">
-                <a16:creationId xmlns:a16="http://schemas.microsoft.com/office/drawing/2014/main" id="{A88A884F-2F71-4554-B6DD-6D97410A37E3}"/>
-              </a:ext>
-            </a:extLst>
-          </p:cNvPr>
-          <p:cNvSpPr txBox="1"/>
-          <p:nvPr/>
-        </p:nvSpPr>
-        <p:spPr>
-          <a:xfrm>
-            <a:off x="7571635" y="1499684"/>
-            <a:ext cx="2718091" cy="646331"/>
-          </a:xfrm>
-          <a:prstGeom prst="rect">
-            <a:avLst/>
-          </a:prstGeom>
-          <a:noFill/>
-        </p:spPr>
-        <p:txBody>
-          <a:bodyPr wrap="square" rtlCol="0">
-            <a:spAutoFit/>
-          </a:bodyPr>
-          <a:lstStyle/>
-          <a:p>
-            <a:r>
-              <a:rPr lang="en-US" dirty="0"/>
-              <a:t>KNN Primitive Results (0.33 test-to-train ratio):</a:t>
-            </a:r>
           </a:p>
         </p:txBody>
       </p:sp>
@@ -5684,8 +5665,8 @@
         </p:nvSpPr>
         <p:spPr>
           <a:xfrm>
-            <a:off x="1371600" y="685800"/>
-            <a:ext cx="9601200" cy="928315"/>
+            <a:off x="1371600" y="581394"/>
+            <a:ext cx="9601200" cy="723682"/>
           </a:xfrm>
         </p:spPr>
         <p:txBody>
@@ -5694,7 +5675,7 @@
           <a:p>
             <a:r>
               <a:rPr lang="en-US" dirty="0"/>
-              <a:t>K-Nearest Neighbor Classifier</a:t>
+              <a:t>Pre-Experiment</a:t>
             </a:r>
           </a:p>
         </p:txBody>
@@ -5717,8 +5698,8 @@
         </p:nvSpPr>
         <p:spPr>
           <a:xfrm>
-            <a:off x="1371600" y="1839401"/>
-            <a:ext cx="6238765" cy="4499776"/>
+            <a:off x="1371600" y="2592926"/>
+            <a:ext cx="4345388" cy="1985084"/>
           </a:xfrm>
         </p:spPr>
         <p:txBody>
@@ -5729,19 +5710,13 @@
           <a:p>
             <a:r>
               <a:rPr lang="en-US" sz="2400" dirty="0"/>
-              <a:t>Supervised learning model</a:t>
+              <a:t>Visualizations</a:t>
             </a:r>
           </a:p>
           <a:p>
             <a:r>
               <a:rPr lang="en-US" sz="2400" dirty="0"/>
-              <a:t>Uses k-closest training samples in feature space</a:t>
-            </a:r>
-          </a:p>
-          <a:p>
-            <a:r>
-              <a:rPr lang="en-US" sz="2400" dirty="0"/>
-              <a:t>Known as Lazy Learning model</a:t>
+              <a:t>Numericalization (Label Encoding) of 3 categorical features</a:t>
             </a:r>
           </a:p>
         </p:txBody>
@@ -5775,12 +5750,66 @@
           </a:p>
         </p:txBody>
       </p:sp>
+      <p:sp>
+        <p:nvSpPr>
+          <p:cNvPr id="12" name="Title 1">
+            <a:extLst>
+              <a:ext uri="{FF2B5EF4-FFF2-40B4-BE49-F238E27FC236}">
+                <a16:creationId xmlns:a16="http://schemas.microsoft.com/office/drawing/2014/main" id="{E905192A-9A31-4A10-96D3-AE8E064D6E3F}"/>
+              </a:ext>
+            </a:extLst>
+          </p:cNvPr>
+          <p:cNvSpPr txBox="1">
+            <a:spLocks/>
+          </p:cNvSpPr>
+          <p:nvPr/>
+        </p:nvSpPr>
+        <p:spPr>
+          <a:xfrm>
+            <a:off x="1371600" y="1926109"/>
+            <a:ext cx="3849094" cy="464158"/>
+          </a:xfrm>
+          <a:prstGeom prst="rect">
+            <a:avLst/>
+          </a:prstGeom>
+        </p:spPr>
+        <p:txBody>
+          <a:bodyPr vert="horz" lIns="91440" tIns="45720" rIns="91440" bIns="45720" rtlCol="0" anchor="t">
+            <a:normAutofit fontScale="92500" lnSpcReduction="10000"/>
+          </a:bodyPr>
+          <a:lstStyle>
+            <a:lvl1pPr algn="l" defTabSz="914400" rtl="0" eaLnBrk="1" latinLnBrk="0" hangingPunct="1">
+              <a:lnSpc>
+                <a:spcPct val="89000"/>
+              </a:lnSpc>
+              <a:spcBef>
+                <a:spcPct val="0"/>
+              </a:spcBef>
+              <a:buNone/>
+              <a:defRPr sz="4400" kern="1200" baseline="0">
+                <a:solidFill>
+                  <a:schemeClr val="tx2"/>
+                </a:solidFill>
+                <a:latin typeface="+mj-lt"/>
+                <a:ea typeface="+mj-ea"/>
+                <a:cs typeface="+mj-cs"/>
+              </a:defRPr>
+            </a:lvl1pPr>
+          </a:lstStyle>
+          <a:p>
+            <a:r>
+              <a:rPr lang="en-US" sz="3200" dirty="0"/>
+              <a:t>Pre-processing:</a:t>
+            </a:r>
+          </a:p>
+        </p:txBody>
+      </p:sp>
       <p:pic>
         <p:nvPicPr>
-          <p:cNvPr id="7" name="Picture 6">
-            <a:extLst>
-              <a:ext uri="{FF2B5EF4-FFF2-40B4-BE49-F238E27FC236}">
-                <a16:creationId xmlns:a16="http://schemas.microsoft.com/office/drawing/2014/main" id="{0AE03EB1-E3F2-4F35-932D-A7A45D48B106}"/>
+          <p:cNvPr id="13" name="Picture 12">
+            <a:extLst>
+              <a:ext uri="{FF2B5EF4-FFF2-40B4-BE49-F238E27FC236}">
+                <a16:creationId xmlns:a16="http://schemas.microsoft.com/office/drawing/2014/main" id="{C4760C41-5194-442D-AB70-CA2FE6B6031B}"/>
               </a:ext>
             </a:extLst>
           </p:cNvPr>
@@ -5797,8 +5826,98 @@
         </p:blipFill>
         <p:spPr>
           <a:xfrm>
-            <a:off x="7717150" y="1839401"/>
-            <a:ext cx="4282297" cy="3329485"/>
+            <a:off x="5841049" y="79666"/>
+            <a:ext cx="3386581" cy="2447647"/>
+          </a:xfrm>
+          <a:prstGeom prst="rect">
+            <a:avLst/>
+          </a:prstGeom>
+        </p:spPr>
+      </p:pic>
+      <p:pic>
+        <p:nvPicPr>
+          <p:cNvPr id="14" name="Picture 13">
+            <a:extLst>
+              <a:ext uri="{FF2B5EF4-FFF2-40B4-BE49-F238E27FC236}">
+                <a16:creationId xmlns:a16="http://schemas.microsoft.com/office/drawing/2014/main" id="{DAA8EE4E-9B03-424A-8440-1E701CB6AB8E}"/>
+              </a:ext>
+            </a:extLst>
+          </p:cNvPr>
+          <p:cNvPicPr>
+            <a:picLocks noChangeAspect="1"/>
+          </p:cNvPicPr>
+          <p:nvPr/>
+        </p:nvPicPr>
+        <p:blipFill>
+          <a:blip r:embed="rId3"/>
+          <a:stretch>
+            <a:fillRect/>
+          </a:stretch>
+        </p:blipFill>
+        <p:spPr>
+          <a:xfrm>
+            <a:off x="5853652" y="2592926"/>
+            <a:ext cx="6268920" cy="2082833"/>
+          </a:xfrm>
+          <a:prstGeom prst="rect">
+            <a:avLst/>
+          </a:prstGeom>
+        </p:spPr>
+      </p:pic>
+      <p:pic>
+        <p:nvPicPr>
+          <p:cNvPr id="15" name="Picture 14">
+            <a:extLst>
+              <a:ext uri="{FF2B5EF4-FFF2-40B4-BE49-F238E27FC236}">
+                <a16:creationId xmlns:a16="http://schemas.microsoft.com/office/drawing/2014/main" id="{C387C55F-1F2E-4916-B8C1-AE61FEBB9A98}"/>
+              </a:ext>
+            </a:extLst>
+          </p:cNvPr>
+          <p:cNvPicPr>
+            <a:picLocks noChangeAspect="1"/>
+          </p:cNvPicPr>
+          <p:nvPr/>
+        </p:nvPicPr>
+        <p:blipFill>
+          <a:blip r:embed="rId4"/>
+          <a:stretch>
+            <a:fillRect/>
+          </a:stretch>
+        </p:blipFill>
+        <p:spPr>
+          <a:xfrm>
+            <a:off x="9303044" y="93948"/>
+            <a:ext cx="2819527" cy="2447647"/>
+          </a:xfrm>
+          <a:prstGeom prst="rect">
+            <a:avLst/>
+          </a:prstGeom>
+        </p:spPr>
+      </p:pic>
+      <p:pic>
+        <p:nvPicPr>
+          <p:cNvPr id="16" name="Picture 15">
+            <a:extLst>
+              <a:ext uri="{FF2B5EF4-FFF2-40B4-BE49-F238E27FC236}">
+                <a16:creationId xmlns:a16="http://schemas.microsoft.com/office/drawing/2014/main" id="{5EDF4712-1CC1-4C3E-9822-B4268B13743A}"/>
+              </a:ext>
+            </a:extLst>
+          </p:cNvPr>
+          <p:cNvPicPr>
+            <a:picLocks noChangeAspect="1"/>
+          </p:cNvPicPr>
+          <p:nvPr/>
+        </p:nvPicPr>
+        <p:blipFill>
+          <a:blip r:embed="rId5"/>
+          <a:stretch>
+            <a:fillRect/>
+          </a:stretch>
+        </p:blipFill>
+        <p:spPr>
+          <a:xfrm>
+            <a:off x="9303043" y="4727090"/>
+            <a:ext cx="2819527" cy="2082833"/>
           </a:xfrm>
           <a:prstGeom prst="rect">
             <a:avLst/>
@@ -5808,7 +5927,7 @@
     </p:spTree>
     <p:extLst>
       <p:ext uri="{BB962C8B-B14F-4D97-AF65-F5344CB8AC3E}">
-        <p14:creationId xmlns:p14="http://schemas.microsoft.com/office/powerpoint/2010/main" val="4194411716"/>
+        <p14:creationId xmlns:p14="http://schemas.microsoft.com/office/powerpoint/2010/main" val="3009136163"/>
       </p:ext>
     </p:extLst>
   </p:cSld>
@@ -5853,8 +5972,8 @@
         </p:nvSpPr>
         <p:spPr>
           <a:xfrm>
-            <a:off x="1371600" y="685800"/>
-            <a:ext cx="9601200" cy="928315"/>
+            <a:off x="1371600" y="581394"/>
+            <a:ext cx="9601200" cy="723682"/>
           </a:xfrm>
         </p:spPr>
         <p:txBody>
@@ -5863,7 +5982,7 @@
           <a:p>
             <a:r>
               <a:rPr lang="en-US" dirty="0"/>
-              <a:t>Support Vector Machines (SVM)</a:t>
+              <a:t>Pre-Experiment</a:t>
             </a:r>
           </a:p>
         </p:txBody>
@@ -5886,8 +6005,8 @@
         </p:nvSpPr>
         <p:spPr>
           <a:xfrm>
-            <a:off x="1371600" y="1839401"/>
-            <a:ext cx="6238765" cy="4499776"/>
+            <a:off x="1371600" y="2592926"/>
+            <a:ext cx="5062024" cy="1985084"/>
           </a:xfrm>
         </p:spPr>
         <p:txBody>
@@ -5898,19 +6017,19 @@
           <a:p>
             <a:r>
               <a:rPr lang="en-US" sz="2400" dirty="0"/>
-              <a:t>Supervised learning model</a:t>
+              <a:t>Used 0.33 Test-to-Train ratio</a:t>
             </a:r>
           </a:p>
           <a:p>
             <a:r>
               <a:rPr lang="en-US" sz="2400" dirty="0"/>
-              <a:t>Creates a separating margin for classification</a:t>
+              <a:t>3 Nearest Neighbors</a:t>
             </a:r>
           </a:p>
           <a:p>
             <a:r>
               <a:rPr lang="en-US" sz="2400" dirty="0"/>
-              <a:t>New data is classified based on whether it exceeds the determined threshold margin</a:t>
+              <a:t>10% of KDD-99 Dataset</a:t>
             </a:r>
           </a:p>
         </p:txBody>
@@ -5944,12 +6063,59 @@
           </a:p>
         </p:txBody>
       </p:sp>
+      <p:sp>
+        <p:nvSpPr>
+          <p:cNvPr id="6" name="TextBox 5">
+            <a:extLst>
+              <a:ext uri="{FF2B5EF4-FFF2-40B4-BE49-F238E27FC236}">
+                <a16:creationId xmlns:a16="http://schemas.microsoft.com/office/drawing/2014/main" id="{FA46D57D-3115-453C-8D5F-D3D42251DA26}"/>
+              </a:ext>
+            </a:extLst>
+          </p:cNvPr>
+          <p:cNvSpPr txBox="1"/>
+          <p:nvPr/>
+        </p:nvSpPr>
+        <p:spPr>
+          <a:xfrm>
+            <a:off x="6783743" y="5331040"/>
+            <a:ext cx="3130821" cy="923330"/>
+          </a:xfrm>
+          <a:prstGeom prst="rect">
+            <a:avLst/>
+          </a:prstGeom>
+          <a:noFill/>
+        </p:spPr>
+        <p:txBody>
+          <a:bodyPr wrap="square" rtlCol="0">
+            <a:spAutoFit/>
+          </a:bodyPr>
+          <a:lstStyle/>
+          <a:p>
+            <a:r>
+              <a:rPr lang="en-US" dirty="0"/>
+              <a:t>Training Time: 139 seconds</a:t>
+            </a:r>
+          </a:p>
+          <a:p>
+            <a:r>
+              <a:rPr lang="en-US" dirty="0"/>
+              <a:t>Testing Time: 281 seconds</a:t>
+            </a:r>
+          </a:p>
+          <a:p>
+            <a:r>
+              <a:rPr lang="en-US" dirty="0"/>
+              <a:t>Accuracy: 99.9%</a:t>
+            </a:r>
+          </a:p>
+        </p:txBody>
+      </p:sp>
       <p:pic>
         <p:nvPicPr>
-          <p:cNvPr id="8" name="Picture 7">
-            <a:extLst>
-              <a:ext uri="{FF2B5EF4-FFF2-40B4-BE49-F238E27FC236}">
-                <a16:creationId xmlns:a16="http://schemas.microsoft.com/office/drawing/2014/main" id="{B092E1E5-C0BC-430A-98EA-840FCDB67C1E}"/>
+          <p:cNvPr id="7" name="Picture 6">
+            <a:extLst>
+              <a:ext uri="{FF2B5EF4-FFF2-40B4-BE49-F238E27FC236}">
+                <a16:creationId xmlns:a16="http://schemas.microsoft.com/office/drawing/2014/main" id="{41D846A5-DA23-4B9A-AA53-96796EEE54E3}"/>
               </a:ext>
             </a:extLst>
           </p:cNvPr>
@@ -5966,18 +6132,102 @@
         </p:blipFill>
         <p:spPr>
           <a:xfrm>
-            <a:off x="7763658" y="1577698"/>
-            <a:ext cx="4276127" cy="3702603"/>
+            <a:off x="6783743" y="2158188"/>
+            <a:ext cx="5062024" cy="2588974"/>
           </a:xfrm>
           <a:prstGeom prst="rect">
             <a:avLst/>
           </a:prstGeom>
         </p:spPr>
       </p:pic>
+      <p:pic>
+        <p:nvPicPr>
+          <p:cNvPr id="8" name="Picture 7">
+            <a:extLst>
+              <a:ext uri="{FF2B5EF4-FFF2-40B4-BE49-F238E27FC236}">
+                <a16:creationId xmlns:a16="http://schemas.microsoft.com/office/drawing/2014/main" id="{CFB41A24-1876-4922-88D6-63321AAC6807}"/>
+              </a:ext>
+            </a:extLst>
+          </p:cNvPr>
+          <p:cNvPicPr>
+            <a:picLocks noChangeAspect="1"/>
+          </p:cNvPicPr>
+          <p:nvPr/>
+        </p:nvPicPr>
+        <p:blipFill>
+          <a:blip r:embed="rId3"/>
+          <a:stretch>
+            <a:fillRect/>
+          </a:stretch>
+        </p:blipFill>
+        <p:spPr>
+          <a:xfrm>
+            <a:off x="6783743" y="4796987"/>
+            <a:ext cx="2815276" cy="484228"/>
+          </a:xfrm>
+          <a:prstGeom prst="rect">
+            <a:avLst/>
+          </a:prstGeom>
+        </p:spPr>
+      </p:pic>
+      <p:sp>
+        <p:nvSpPr>
+          <p:cNvPr id="12" name="Title 1">
+            <a:extLst>
+              <a:ext uri="{FF2B5EF4-FFF2-40B4-BE49-F238E27FC236}">
+                <a16:creationId xmlns:a16="http://schemas.microsoft.com/office/drawing/2014/main" id="{E905192A-9A31-4A10-96D3-AE8E064D6E3F}"/>
+              </a:ext>
+            </a:extLst>
+          </p:cNvPr>
+          <p:cNvSpPr txBox="1">
+            <a:spLocks/>
+          </p:cNvSpPr>
+          <p:nvPr/>
+        </p:nvSpPr>
+        <p:spPr>
+          <a:xfrm>
+            <a:off x="1371600" y="1926109"/>
+            <a:ext cx="3849094" cy="464158"/>
+          </a:xfrm>
+          <a:prstGeom prst="rect">
+            <a:avLst/>
+          </a:prstGeom>
+        </p:spPr>
+        <p:txBody>
+          <a:bodyPr vert="horz" lIns="91440" tIns="45720" rIns="91440" bIns="45720" rtlCol="0" anchor="t">
+            <a:normAutofit fontScale="92500" lnSpcReduction="10000"/>
+          </a:bodyPr>
+          <a:lstStyle>
+            <a:lvl1pPr algn="l" defTabSz="914400" rtl="0" eaLnBrk="1" latinLnBrk="0" hangingPunct="1">
+              <a:lnSpc>
+                <a:spcPct val="89000"/>
+              </a:lnSpc>
+              <a:spcBef>
+                <a:spcPct val="0"/>
+              </a:spcBef>
+              <a:buNone/>
+              <a:defRPr sz="4400" kern="1200" baseline="0">
+                <a:solidFill>
+                  <a:schemeClr val="tx2"/>
+                </a:solidFill>
+                <a:latin typeface="+mj-lt"/>
+                <a:ea typeface="+mj-ea"/>
+                <a:cs typeface="+mj-cs"/>
+              </a:defRPr>
+            </a:lvl1pPr>
+          </a:lstStyle>
+          <a:p>
+            <a:r>
+              <a:rPr lang="en-US" sz="3200" dirty="0"/>
+              <a:t>K-Nearest Neighbors:</a:t>
+            </a:r>
+          </a:p>
+        </p:txBody>
+      </p:sp>
     </p:spTree>
     <p:extLst>
       <p:ext uri="{BB962C8B-B14F-4D97-AF65-F5344CB8AC3E}">
-        <p14:creationId xmlns:p14="http://schemas.microsoft.com/office/powerpoint/2010/main" val="1093773152"/>
+        <p14:creationId xmlns:p14="http://schemas.microsoft.com/office/powerpoint/2010/main" val="2592701822"/>
       </p:ext>
     </p:extLst>
   </p:cSld>
@@ -6022,8 +6272,8 @@
         </p:nvSpPr>
         <p:spPr>
           <a:xfrm>
-            <a:off x="1371600" y="685800"/>
-            <a:ext cx="9601200" cy="928315"/>
+            <a:off x="1371600" y="581394"/>
+            <a:ext cx="9601200" cy="723682"/>
           </a:xfrm>
         </p:spPr>
         <p:txBody>
@@ -6032,7 +6282,7 @@
           <a:p>
             <a:r>
               <a:rPr lang="en-US" dirty="0"/>
-              <a:t>Long Short-term Memory</a:t>
+              <a:t>Pre-Experiment</a:t>
             </a:r>
           </a:p>
         </p:txBody>
@@ -6055,8 +6305,8 @@
         </p:nvSpPr>
         <p:spPr>
           <a:xfrm>
-            <a:off x="1371600" y="1726759"/>
-            <a:ext cx="7843962" cy="1985084"/>
+            <a:off x="1371600" y="2592926"/>
+            <a:ext cx="5062024" cy="1985084"/>
           </a:xfrm>
         </p:spPr>
         <p:txBody>
@@ -6067,19 +6317,19 @@
           <a:p>
             <a:r>
               <a:rPr lang="en-US" sz="2400" dirty="0"/>
-              <a:t>A type of Recurrent Neural Network</a:t>
+              <a:t>Used 0.33 Test-to-Train ratio</a:t>
             </a:r>
           </a:p>
           <a:p>
             <a:r>
               <a:rPr lang="en-US" sz="2400" dirty="0"/>
-              <a:t>Short-term memory learns short chains of data recurrently</a:t>
+              <a:t>30 Estimators</a:t>
             </a:r>
           </a:p>
           <a:p>
             <a:r>
               <a:rPr lang="en-US" sz="2400" dirty="0"/>
-              <a:t>Uses Long memory to store learned relevant information</a:t>
+              <a:t>10% of KDD-99 Dataset</a:t>
             </a:r>
           </a:p>
         </p:txBody>
@@ -6113,12 +6363,113 @@
           </a:p>
         </p:txBody>
       </p:sp>
+      <p:sp>
+        <p:nvSpPr>
+          <p:cNvPr id="6" name="TextBox 5">
+            <a:extLst>
+              <a:ext uri="{FF2B5EF4-FFF2-40B4-BE49-F238E27FC236}">
+                <a16:creationId xmlns:a16="http://schemas.microsoft.com/office/drawing/2014/main" id="{FA46D57D-3115-453C-8D5F-D3D42251DA26}"/>
+              </a:ext>
+            </a:extLst>
+          </p:cNvPr>
+          <p:cNvSpPr txBox="1"/>
+          <p:nvPr/>
+        </p:nvSpPr>
+        <p:spPr>
+          <a:xfrm>
+            <a:off x="6783743" y="5331040"/>
+            <a:ext cx="3130821" cy="923330"/>
+          </a:xfrm>
+          <a:prstGeom prst="rect">
+            <a:avLst/>
+          </a:prstGeom>
+          <a:noFill/>
+        </p:spPr>
+        <p:txBody>
+          <a:bodyPr wrap="square" rtlCol="0">
+            <a:spAutoFit/>
+          </a:bodyPr>
+          <a:lstStyle/>
+          <a:p>
+            <a:r>
+              <a:rPr lang="en-US" dirty="0"/>
+              <a:t>Training Time: 7.11 seconds</a:t>
+            </a:r>
+          </a:p>
+          <a:p>
+            <a:r>
+              <a:rPr lang="en-US" dirty="0"/>
+              <a:t>Testing Time: 0.39 seconds</a:t>
+            </a:r>
+          </a:p>
+          <a:p>
+            <a:r>
+              <a:rPr lang="en-US" dirty="0"/>
+              <a:t>Accuracy: 99.9%</a:t>
+            </a:r>
+          </a:p>
+        </p:txBody>
+      </p:sp>
+      <p:sp>
+        <p:nvSpPr>
+          <p:cNvPr id="12" name="Title 1">
+            <a:extLst>
+              <a:ext uri="{FF2B5EF4-FFF2-40B4-BE49-F238E27FC236}">
+                <a16:creationId xmlns:a16="http://schemas.microsoft.com/office/drawing/2014/main" id="{E905192A-9A31-4A10-96D3-AE8E064D6E3F}"/>
+              </a:ext>
+            </a:extLst>
+          </p:cNvPr>
+          <p:cNvSpPr txBox="1">
+            <a:spLocks/>
+          </p:cNvSpPr>
+          <p:nvPr/>
+        </p:nvSpPr>
+        <p:spPr>
+          <a:xfrm>
+            <a:off x="1371600" y="1926109"/>
+            <a:ext cx="3849094" cy="464158"/>
+          </a:xfrm>
+          <a:prstGeom prst="rect">
+            <a:avLst/>
+          </a:prstGeom>
+        </p:spPr>
+        <p:txBody>
+          <a:bodyPr vert="horz" lIns="91440" tIns="45720" rIns="91440" bIns="45720" rtlCol="0" anchor="t">
+            <a:normAutofit fontScale="92500" lnSpcReduction="10000"/>
+          </a:bodyPr>
+          <a:lstStyle>
+            <a:lvl1pPr algn="l" defTabSz="914400" rtl="0" eaLnBrk="1" latinLnBrk="0" hangingPunct="1">
+              <a:lnSpc>
+                <a:spcPct val="89000"/>
+              </a:lnSpc>
+              <a:spcBef>
+                <a:spcPct val="0"/>
+              </a:spcBef>
+              <a:buNone/>
+              <a:defRPr sz="4400" kern="1200" baseline="0">
+                <a:solidFill>
+                  <a:schemeClr val="tx2"/>
+                </a:solidFill>
+                <a:latin typeface="+mj-lt"/>
+                <a:ea typeface="+mj-ea"/>
+                <a:cs typeface="+mj-cs"/>
+              </a:defRPr>
+            </a:lvl1pPr>
+          </a:lstStyle>
+          <a:p>
+            <a:r>
+              <a:rPr lang="en-US" sz="3200" dirty="0"/>
+              <a:t>Random Forest</a:t>
+            </a:r>
+          </a:p>
+        </p:txBody>
+      </p:sp>
       <p:pic>
         <p:nvPicPr>
-          <p:cNvPr id="5" name="Picture 4">
-            <a:extLst>
-              <a:ext uri="{FF2B5EF4-FFF2-40B4-BE49-F238E27FC236}">
-                <a16:creationId xmlns:a16="http://schemas.microsoft.com/office/drawing/2014/main" id="{9A08613F-13F6-4C8C-BBE1-49E2350FEECB}"/>
+          <p:cNvPr id="9" name="Picture 8">
+            <a:extLst>
+              <a:ext uri="{FF2B5EF4-FFF2-40B4-BE49-F238E27FC236}">
+                <a16:creationId xmlns:a16="http://schemas.microsoft.com/office/drawing/2014/main" id="{FB3BF3AE-E06B-4F65-AE89-DB75CAD328CF}"/>
               </a:ext>
             </a:extLst>
           </p:cNvPr>
@@ -6135,8 +6486,38 @@
         </p:blipFill>
         <p:spPr>
           <a:xfrm>
-            <a:off x="2936625" y="3959659"/>
-            <a:ext cx="6471150" cy="2347713"/>
+            <a:off x="6783743" y="2299449"/>
+            <a:ext cx="5062025" cy="2447713"/>
+          </a:xfrm>
+          <a:prstGeom prst="rect">
+            <a:avLst/>
+          </a:prstGeom>
+        </p:spPr>
+      </p:pic>
+      <p:pic>
+        <p:nvPicPr>
+          <p:cNvPr id="11" name="Picture 10">
+            <a:extLst>
+              <a:ext uri="{FF2B5EF4-FFF2-40B4-BE49-F238E27FC236}">
+                <a16:creationId xmlns:a16="http://schemas.microsoft.com/office/drawing/2014/main" id="{854E3ABF-F318-49B1-82DD-BF29718DFFC3}"/>
+              </a:ext>
+            </a:extLst>
+          </p:cNvPr>
+          <p:cNvPicPr>
+            <a:picLocks noChangeAspect="1"/>
+          </p:cNvPicPr>
+          <p:nvPr/>
+        </p:nvPicPr>
+        <p:blipFill>
+          <a:blip r:embed="rId3"/>
+          <a:stretch>
+            <a:fillRect/>
+          </a:stretch>
+        </p:blipFill>
+        <p:spPr>
+          <a:xfrm>
+            <a:off x="6783743" y="4817655"/>
+            <a:ext cx="2343477" cy="314369"/>
           </a:xfrm>
           <a:prstGeom prst="rect">
             <a:avLst/>
@@ -6146,7 +6527,7 @@
     </p:spTree>
     <p:extLst>
       <p:ext uri="{BB962C8B-B14F-4D97-AF65-F5344CB8AC3E}">
-        <p14:creationId xmlns:p14="http://schemas.microsoft.com/office/powerpoint/2010/main" val="3175228227"/>
+        <p14:creationId xmlns:p14="http://schemas.microsoft.com/office/powerpoint/2010/main" val="869052601"/>
       </p:ext>
     </p:extLst>
   </p:cSld>
@@ -6178,7 +6559,7 @@
           <p:cNvPr id="2" name="Title 1">
             <a:extLst>
               <a:ext uri="{FF2B5EF4-FFF2-40B4-BE49-F238E27FC236}">
-                <a16:creationId xmlns:a16="http://schemas.microsoft.com/office/drawing/2014/main" id="{A321EBDA-AD78-4909-9669-C65C61C9CCB5}"/>
+                <a16:creationId xmlns:a16="http://schemas.microsoft.com/office/drawing/2014/main" id="{91582333-D57C-409C-9700-B3C0721E4DB2}"/>
               </a:ext>
             </a:extLst>
           </p:cNvPr>
@@ -6191,8 +6572,8 @@
         </p:nvSpPr>
         <p:spPr>
           <a:xfrm>
-            <a:off x="1371600" y="581394"/>
-            <a:ext cx="9601200" cy="723682"/>
+            <a:off x="1371600" y="685800"/>
+            <a:ext cx="9601200" cy="689776"/>
           </a:xfrm>
         </p:spPr>
         <p:txBody>
@@ -6201,7 +6582,7 @@
           <a:p>
             <a:r>
               <a:rPr lang="en-US" dirty="0"/>
-              <a:t>Pre-Experiment</a:t>
+              <a:t>User Interface:</a:t>
             </a:r>
           </a:p>
         </p:txBody>
@@ -6211,7 +6592,7 @@
           <p:cNvPr id="3" name="Content Placeholder 2">
             <a:extLst>
               <a:ext uri="{FF2B5EF4-FFF2-40B4-BE49-F238E27FC236}">
-                <a16:creationId xmlns:a16="http://schemas.microsoft.com/office/drawing/2014/main" id="{F027C83D-1275-4F7F-A79A-74D1C05EDCEA}"/>
+                <a16:creationId xmlns:a16="http://schemas.microsoft.com/office/drawing/2014/main" id="{28A56A07-10D4-44C1-83F6-A5435775971B}"/>
               </a:ext>
             </a:extLst>
           </p:cNvPr>
@@ -6224,8 +6605,8 @@
         </p:nvSpPr>
         <p:spPr>
           <a:xfrm>
-            <a:off x="1371600" y="2592926"/>
-            <a:ext cx="4345388" cy="1985084"/>
+            <a:off x="1371600" y="1431235"/>
+            <a:ext cx="9601200" cy="1997765"/>
           </a:xfrm>
         </p:spPr>
         <p:txBody>
@@ -6235,18 +6616,36 @@
           <a:lstStyle/>
           <a:p>
             <a:r>
-              <a:rPr lang="en-US" sz="2400" dirty="0"/>
-              <a:t>Visualizations</a:t>
-            </a:r>
-          </a:p>
-          <a:p>
-            <a:r>
-              <a:rPr lang="en-US" sz="2400" dirty="0" err="1"/>
-              <a:t>Numericalization</a:t>
-            </a:r>
-            <a:r>
-              <a:rPr lang="en-US" sz="2400" dirty="0"/>
-              <a:t> (Label Encoding) of 3 categorical features</a:t>
+              <a:rPr lang="en-US" dirty="0"/>
+              <a:t>The users of the system can be multi-levels:</a:t>
+            </a:r>
+          </a:p>
+          <a:p>
+            <a:pPr lvl="1"/>
+            <a:r>
+              <a:rPr lang="en-US" dirty="0"/>
+              <a:t>General Audience Individuals</a:t>
+            </a:r>
+          </a:p>
+          <a:p>
+            <a:pPr lvl="1"/>
+            <a:r>
+              <a:rPr lang="en-US" dirty="0"/>
+              <a:t>System Administrators</a:t>
+            </a:r>
+          </a:p>
+          <a:p>
+            <a:pPr lvl="1"/>
+            <a:r>
+              <a:rPr lang="en-US" dirty="0"/>
+              <a:t>Defensive/Testing Security Professionals</a:t>
+            </a:r>
+          </a:p>
+          <a:p>
+            <a:pPr lvl="1"/>
+            <a:r>
+              <a:rPr lang="en-US" dirty="0"/>
+              <a:t>Governmental Agencies taking security measures</a:t>
             </a:r>
           </a:p>
         </p:txBody>
@@ -6256,7 +6655,7 @@
           <p:cNvPr id="4" name="Slide Number Placeholder 3">
             <a:extLst>
               <a:ext uri="{FF2B5EF4-FFF2-40B4-BE49-F238E27FC236}">
-                <a16:creationId xmlns:a16="http://schemas.microsoft.com/office/drawing/2014/main" id="{FA71D55F-38EB-4A80-98E2-872986716F64}"/>
+                <a16:creationId xmlns:a16="http://schemas.microsoft.com/office/drawing/2014/main" id="{0B483C04-466F-499D-A85C-A1B3EAC844FA}"/>
               </a:ext>
             </a:extLst>
           </p:cNvPr>
@@ -6282,10 +6681,10 @@
       </p:sp>
       <p:sp>
         <p:nvSpPr>
-          <p:cNvPr id="12" name="Title 1">
-            <a:extLst>
-              <a:ext uri="{FF2B5EF4-FFF2-40B4-BE49-F238E27FC236}">
-                <a16:creationId xmlns:a16="http://schemas.microsoft.com/office/drawing/2014/main" id="{E905192A-9A31-4A10-96D3-AE8E064D6E3F}"/>
+          <p:cNvPr id="5" name="Content Placeholder 2">
+            <a:extLst>
+              <a:ext uri="{FF2B5EF4-FFF2-40B4-BE49-F238E27FC236}">
+                <a16:creationId xmlns:a16="http://schemas.microsoft.com/office/drawing/2014/main" id="{64F0188F-A50A-4DDB-9D4A-4FAFF652CBD0}"/>
               </a:ext>
             </a:extLst>
           </p:cNvPr>
@@ -6296,168 +6695,263 @@
         </p:nvSpPr>
         <p:spPr>
           <a:xfrm>
-            <a:off x="1371600" y="1926109"/>
-            <a:ext cx="3849094" cy="464158"/>
+            <a:off x="1371600" y="3706633"/>
+            <a:ext cx="9601200" cy="2746753"/>
           </a:xfrm>
           <a:prstGeom prst="rect">
             <a:avLst/>
           </a:prstGeom>
         </p:spPr>
         <p:txBody>
-          <a:bodyPr vert="horz" lIns="91440" tIns="45720" rIns="91440" bIns="45720" rtlCol="0" anchor="t">
-            <a:normAutofit fontScale="92500" lnSpcReduction="10000"/>
+          <a:bodyPr vert="horz" lIns="91440" tIns="45720" rIns="91440" bIns="45720" rtlCol="0">
+            <a:normAutofit/>
           </a:bodyPr>
           <a:lstStyle>
-            <a:lvl1pPr algn="l" defTabSz="914400" rtl="0" eaLnBrk="1" latinLnBrk="0" hangingPunct="1">
+            <a:lvl1pPr marL="384048" indent="-384048" algn="l" defTabSz="914400" rtl="0" eaLnBrk="1" latinLnBrk="0" hangingPunct="1">
               <a:lnSpc>
-                <a:spcPct val="89000"/>
+                <a:spcPct val="94000"/>
               </a:lnSpc>
               <a:spcBef>
-                <a:spcPct val="0"/>
+                <a:spcPts val="1000"/>
               </a:spcBef>
-              <a:buNone/>
-              <a:defRPr sz="4400" kern="1200" baseline="0">
+              <a:spcAft>
+                <a:spcPts val="200"/>
+              </a:spcAft>
+              <a:buFont typeface="Franklin Gothic Book" panose="020B0503020102020204" pitchFamily="34" charset="0"/>
+              <a:buChar char="■"/>
+              <a:defRPr sz="2000" kern="1200" baseline="0">
                 <a:solidFill>
                   <a:schemeClr val="tx2"/>
                 </a:solidFill>
-                <a:latin typeface="+mj-lt"/>
-                <a:ea typeface="+mj-ea"/>
-                <a:cs typeface="+mj-cs"/>
+                <a:latin typeface="+mn-lt"/>
+                <a:ea typeface="+mn-ea"/>
+                <a:cs typeface="+mn-cs"/>
               </a:defRPr>
             </a:lvl1pPr>
+            <a:lvl2pPr marL="914400" indent="-384048" algn="l" defTabSz="914400" rtl="0" eaLnBrk="1" latinLnBrk="0" hangingPunct="1">
+              <a:lnSpc>
+                <a:spcPct val="94000"/>
+              </a:lnSpc>
+              <a:spcBef>
+                <a:spcPts val="500"/>
+              </a:spcBef>
+              <a:spcAft>
+                <a:spcPts val="200"/>
+              </a:spcAft>
+              <a:buFont typeface="Franklin Gothic Book" panose="020B0503020102020204" pitchFamily="34" charset="0"/>
+              <a:buChar char="–"/>
+              <a:defRPr sz="2000" i="1" kern="1200" baseline="0">
+                <a:solidFill>
+                  <a:schemeClr val="tx2"/>
+                </a:solidFill>
+                <a:latin typeface="+mn-lt"/>
+                <a:ea typeface="+mn-ea"/>
+                <a:cs typeface="+mn-cs"/>
+              </a:defRPr>
+            </a:lvl2pPr>
+            <a:lvl3pPr marL="1371600" indent="-384048" algn="l" defTabSz="914400" rtl="0" eaLnBrk="1" latinLnBrk="0" hangingPunct="1">
+              <a:lnSpc>
+                <a:spcPct val="94000"/>
+              </a:lnSpc>
+              <a:spcBef>
+                <a:spcPts val="500"/>
+              </a:spcBef>
+              <a:spcAft>
+                <a:spcPts val="200"/>
+              </a:spcAft>
+              <a:buFont typeface="Franklin Gothic Book" panose="020B0503020102020204" pitchFamily="34" charset="0"/>
+              <a:buChar char="■"/>
+              <a:defRPr sz="1800" kern="1200" baseline="0">
+                <a:solidFill>
+                  <a:schemeClr val="tx2"/>
+                </a:solidFill>
+                <a:latin typeface="+mn-lt"/>
+                <a:ea typeface="+mn-ea"/>
+                <a:cs typeface="+mn-cs"/>
+              </a:defRPr>
+            </a:lvl3pPr>
+            <a:lvl4pPr marL="1828800" indent="-384048" algn="l" defTabSz="914400" rtl="0" eaLnBrk="1" latinLnBrk="0" hangingPunct="1">
+              <a:lnSpc>
+                <a:spcPct val="94000"/>
+              </a:lnSpc>
+              <a:spcBef>
+                <a:spcPts val="500"/>
+              </a:spcBef>
+              <a:spcAft>
+                <a:spcPts val="200"/>
+              </a:spcAft>
+              <a:buFont typeface="Franklin Gothic Book" panose="020B0503020102020204" pitchFamily="34" charset="0"/>
+              <a:buChar char="–"/>
+              <a:defRPr sz="1800" i="1" kern="1200" baseline="0">
+                <a:solidFill>
+                  <a:schemeClr val="tx2"/>
+                </a:solidFill>
+                <a:latin typeface="+mn-lt"/>
+                <a:ea typeface="+mn-ea"/>
+                <a:cs typeface="+mn-cs"/>
+              </a:defRPr>
+            </a:lvl4pPr>
+            <a:lvl5pPr marL="2286000" indent="-384048" algn="l" defTabSz="914400" rtl="0" eaLnBrk="1" latinLnBrk="0" hangingPunct="1">
+              <a:lnSpc>
+                <a:spcPct val="94000"/>
+              </a:lnSpc>
+              <a:spcBef>
+                <a:spcPts val="500"/>
+              </a:spcBef>
+              <a:spcAft>
+                <a:spcPts val="200"/>
+              </a:spcAft>
+              <a:buFont typeface="Franklin Gothic Book" panose="020B0503020102020204" pitchFamily="34" charset="0"/>
+              <a:buChar char="■"/>
+              <a:defRPr sz="1600" kern="1200" baseline="0">
+                <a:solidFill>
+                  <a:schemeClr val="tx2"/>
+                </a:solidFill>
+                <a:latin typeface="+mn-lt"/>
+                <a:ea typeface="+mn-ea"/>
+                <a:cs typeface="+mn-cs"/>
+              </a:defRPr>
+            </a:lvl5pPr>
+            <a:lvl6pPr marL="2743200" indent="-384048" algn="l" defTabSz="914400" rtl="0" eaLnBrk="1" latinLnBrk="0" hangingPunct="1">
+              <a:lnSpc>
+                <a:spcPct val="94000"/>
+              </a:lnSpc>
+              <a:spcBef>
+                <a:spcPts val="500"/>
+              </a:spcBef>
+              <a:spcAft>
+                <a:spcPts val="200"/>
+              </a:spcAft>
+              <a:buFont typeface="Franklin Gothic Book" panose="020B0503020102020204" pitchFamily="34" charset="0"/>
+              <a:buChar char="–"/>
+              <a:defRPr sz="1600" i="1" kern="1200" baseline="0">
+                <a:solidFill>
+                  <a:schemeClr val="tx2"/>
+                </a:solidFill>
+                <a:latin typeface="+mn-lt"/>
+                <a:ea typeface="+mn-ea"/>
+                <a:cs typeface="+mn-cs"/>
+              </a:defRPr>
+            </a:lvl6pPr>
+            <a:lvl7pPr marL="3200400" indent="-384048" algn="l" defTabSz="914400" rtl="0" eaLnBrk="1" latinLnBrk="0" hangingPunct="1">
+              <a:lnSpc>
+                <a:spcPct val="94000"/>
+              </a:lnSpc>
+              <a:spcBef>
+                <a:spcPts val="500"/>
+              </a:spcBef>
+              <a:spcAft>
+                <a:spcPts val="200"/>
+              </a:spcAft>
+              <a:buFont typeface="Franklin Gothic Book" panose="020B0503020102020204" pitchFamily="34" charset="0"/>
+              <a:buChar char="■"/>
+              <a:defRPr sz="1400" kern="1200" baseline="0">
+                <a:solidFill>
+                  <a:schemeClr val="tx2"/>
+                </a:solidFill>
+                <a:latin typeface="+mn-lt"/>
+                <a:ea typeface="+mn-ea"/>
+                <a:cs typeface="+mn-cs"/>
+              </a:defRPr>
+            </a:lvl7pPr>
+            <a:lvl8pPr marL="3657600" indent="-384048" algn="l" defTabSz="914400" rtl="0" eaLnBrk="1" latinLnBrk="0" hangingPunct="1">
+              <a:lnSpc>
+                <a:spcPct val="94000"/>
+              </a:lnSpc>
+              <a:spcBef>
+                <a:spcPts val="500"/>
+              </a:spcBef>
+              <a:spcAft>
+                <a:spcPts val="200"/>
+              </a:spcAft>
+              <a:buFont typeface="Franklin Gothic Book" panose="020B0503020102020204" pitchFamily="34" charset="0"/>
+              <a:buChar char="–"/>
+              <a:defRPr sz="1400" i="1" kern="1200" baseline="0">
+                <a:solidFill>
+                  <a:schemeClr val="tx2"/>
+                </a:solidFill>
+                <a:latin typeface="+mn-lt"/>
+                <a:ea typeface="+mn-ea"/>
+                <a:cs typeface="+mn-cs"/>
+              </a:defRPr>
+            </a:lvl8pPr>
+            <a:lvl9pPr marL="4114800" indent="-384048" algn="l" defTabSz="914400" rtl="0" eaLnBrk="1" latinLnBrk="0" hangingPunct="1">
+              <a:lnSpc>
+                <a:spcPct val="94000"/>
+              </a:lnSpc>
+              <a:spcBef>
+                <a:spcPts val="500"/>
+              </a:spcBef>
+              <a:spcAft>
+                <a:spcPts val="200"/>
+              </a:spcAft>
+              <a:buFont typeface="Franklin Gothic Book" panose="020B0503020102020204" pitchFamily="34" charset="0"/>
+              <a:buChar char="■"/>
+              <a:defRPr sz="1400" kern="1200" baseline="0">
+                <a:solidFill>
+                  <a:schemeClr val="tx2"/>
+                </a:solidFill>
+                <a:latin typeface="+mn-lt"/>
+                <a:ea typeface="+mn-ea"/>
+                <a:cs typeface="+mn-cs"/>
+              </a:defRPr>
+            </a:lvl9pPr>
           </a:lstStyle>
           <a:p>
             <a:r>
-              <a:rPr lang="en-US" sz="3200" dirty="0"/>
-              <a:t>Pre-processing:</a:t>
-            </a:r>
-          </a:p>
-        </p:txBody>
-      </p:sp>
-      <p:pic>
-        <p:nvPicPr>
-          <p:cNvPr id="13" name="Picture 12">
-            <a:extLst>
-              <a:ext uri="{FF2B5EF4-FFF2-40B4-BE49-F238E27FC236}">
-                <a16:creationId xmlns:a16="http://schemas.microsoft.com/office/drawing/2014/main" id="{C4760C41-5194-442D-AB70-CA2FE6B6031B}"/>
-              </a:ext>
-            </a:extLst>
-          </p:cNvPr>
-          <p:cNvPicPr>
-            <a:picLocks noChangeAspect="1"/>
-          </p:cNvPicPr>
-          <p:nvPr/>
-        </p:nvPicPr>
-        <p:blipFill>
-          <a:blip r:embed="rId2"/>
-          <a:stretch>
-            <a:fillRect/>
-          </a:stretch>
-        </p:blipFill>
-        <p:spPr>
-          <a:xfrm>
-            <a:off x="5841049" y="79666"/>
-            <a:ext cx="3386581" cy="2447647"/>
-          </a:xfrm>
-          <a:prstGeom prst="rect">
-            <a:avLst/>
-          </a:prstGeom>
-        </p:spPr>
-      </p:pic>
-      <p:pic>
-        <p:nvPicPr>
-          <p:cNvPr id="14" name="Picture 13">
-            <a:extLst>
-              <a:ext uri="{FF2B5EF4-FFF2-40B4-BE49-F238E27FC236}">
-                <a16:creationId xmlns:a16="http://schemas.microsoft.com/office/drawing/2014/main" id="{DAA8EE4E-9B03-424A-8440-1E701CB6AB8E}"/>
-              </a:ext>
-            </a:extLst>
-          </p:cNvPr>
-          <p:cNvPicPr>
-            <a:picLocks noChangeAspect="1"/>
-          </p:cNvPicPr>
-          <p:nvPr/>
-        </p:nvPicPr>
-        <p:blipFill>
-          <a:blip r:embed="rId3"/>
-          <a:stretch>
-            <a:fillRect/>
-          </a:stretch>
-        </p:blipFill>
-        <p:spPr>
-          <a:xfrm>
-            <a:off x="5853652" y="2592926"/>
-            <a:ext cx="6268920" cy="2082833"/>
-          </a:xfrm>
-          <a:prstGeom prst="rect">
-            <a:avLst/>
-          </a:prstGeom>
-        </p:spPr>
-      </p:pic>
-      <p:pic>
-        <p:nvPicPr>
-          <p:cNvPr id="15" name="Picture 14">
-            <a:extLst>
-              <a:ext uri="{FF2B5EF4-FFF2-40B4-BE49-F238E27FC236}">
-                <a16:creationId xmlns:a16="http://schemas.microsoft.com/office/drawing/2014/main" id="{C387C55F-1F2E-4916-B8C1-AE61FEBB9A98}"/>
-              </a:ext>
-            </a:extLst>
-          </p:cNvPr>
-          <p:cNvPicPr>
-            <a:picLocks noChangeAspect="1"/>
-          </p:cNvPicPr>
-          <p:nvPr/>
-        </p:nvPicPr>
-        <p:blipFill>
-          <a:blip r:embed="rId4"/>
-          <a:stretch>
-            <a:fillRect/>
-          </a:stretch>
-        </p:blipFill>
-        <p:spPr>
-          <a:xfrm>
-            <a:off x="9303044" y="93948"/>
-            <a:ext cx="2819527" cy="2447647"/>
-          </a:xfrm>
-          <a:prstGeom prst="rect">
-            <a:avLst/>
-          </a:prstGeom>
-        </p:spPr>
-      </p:pic>
-      <p:pic>
-        <p:nvPicPr>
-          <p:cNvPr id="16" name="Picture 15">
-            <a:extLst>
-              <a:ext uri="{FF2B5EF4-FFF2-40B4-BE49-F238E27FC236}">
-                <a16:creationId xmlns:a16="http://schemas.microsoft.com/office/drawing/2014/main" id="{5EDF4712-1CC1-4C3E-9822-B4268B13743A}"/>
-              </a:ext>
-            </a:extLst>
-          </p:cNvPr>
-          <p:cNvPicPr>
-            <a:picLocks noChangeAspect="1"/>
-          </p:cNvPicPr>
-          <p:nvPr/>
-        </p:nvPicPr>
-        <p:blipFill>
-          <a:blip r:embed="rId5"/>
-          <a:stretch>
-            <a:fillRect/>
-          </a:stretch>
-        </p:blipFill>
-        <p:spPr>
-          <a:xfrm>
-            <a:off x="9303043" y="4727090"/>
-            <a:ext cx="2819527" cy="2082833"/>
-          </a:xfrm>
-          <a:prstGeom prst="rect">
-            <a:avLst/>
-          </a:prstGeom>
-        </p:spPr>
-      </p:pic>
+              <a:rPr lang="en-US" dirty="0"/>
+              <a:t>Interface shall preview reports including:</a:t>
+            </a:r>
+          </a:p>
+          <a:p>
+            <a:pPr lvl="1"/>
+            <a:r>
+              <a:rPr lang="en-US" dirty="0"/>
+              <a:t>Normal/Attack packets</a:t>
+            </a:r>
+          </a:p>
+          <a:p>
+            <a:pPr lvl="1"/>
+            <a:r>
+              <a:rPr lang="en-US" dirty="0"/>
+              <a:t>Type of attack in packet</a:t>
+            </a:r>
+          </a:p>
+          <a:p>
+            <a:pPr lvl="1"/>
+            <a:r>
+              <a:rPr lang="en-US" dirty="0"/>
+              <a:t>Time and frequency of attacks</a:t>
+            </a:r>
+          </a:p>
+          <a:p>
+            <a:pPr lvl="1"/>
+            <a:r>
+              <a:rPr lang="en-US" dirty="0"/>
+              <a:t>Trends in attack frequency</a:t>
+            </a:r>
+          </a:p>
+          <a:p>
+            <a:pPr lvl="1"/>
+            <a:r>
+              <a:rPr lang="en-US" dirty="0"/>
+              <a:t>Usual attack sources</a:t>
+            </a:r>
+          </a:p>
+          <a:p>
+            <a:pPr lvl="1"/>
+            <a:endParaRPr lang="en-US" dirty="0"/>
+          </a:p>
+          <a:p>
+            <a:pPr lvl="1"/>
+            <a:endParaRPr lang="en-US" dirty="0"/>
+          </a:p>
+        </p:txBody>
+      </p:sp>
     </p:spTree>
     <p:extLst>
       <p:ext uri="{BB962C8B-B14F-4D97-AF65-F5344CB8AC3E}">
-        <p14:creationId xmlns:p14="http://schemas.microsoft.com/office/powerpoint/2010/main" val="3009136163"/>
+        <p14:creationId xmlns:p14="http://schemas.microsoft.com/office/powerpoint/2010/main" val="1695136661"/>
       </p:ext>
     </p:extLst>
   </p:cSld>
@@ -6489,7 +6983,7 @@
           <p:cNvPr id="2" name="Title 1">
             <a:extLst>
               <a:ext uri="{FF2B5EF4-FFF2-40B4-BE49-F238E27FC236}">
-                <a16:creationId xmlns:a16="http://schemas.microsoft.com/office/drawing/2014/main" id="{A321EBDA-AD78-4909-9669-C65C61C9CCB5}"/>
+                <a16:creationId xmlns:a16="http://schemas.microsoft.com/office/drawing/2014/main" id="{B347763B-84AB-4729-8839-DD4E9241641B}"/>
               </a:ext>
             </a:extLst>
           </p:cNvPr>
@@ -6502,8 +6996,8 @@
         </p:nvSpPr>
         <p:spPr>
           <a:xfrm>
-            <a:off x="1371600" y="581394"/>
-            <a:ext cx="9601200" cy="723682"/>
+            <a:off x="1371600" y="685800"/>
+            <a:ext cx="9601200" cy="761337"/>
           </a:xfrm>
         </p:spPr>
         <p:txBody>
@@ -6512,7 +7006,7 @@
           <a:p>
             <a:r>
               <a:rPr lang="en-US" dirty="0"/>
-              <a:t>Pre-Experiment</a:t>
+              <a:t>Expected Contribution</a:t>
             </a:r>
           </a:p>
         </p:txBody>
@@ -6522,7 +7016,7 @@
           <p:cNvPr id="3" name="Content Placeholder 2">
             <a:extLst>
               <a:ext uri="{FF2B5EF4-FFF2-40B4-BE49-F238E27FC236}">
-                <a16:creationId xmlns:a16="http://schemas.microsoft.com/office/drawing/2014/main" id="{F027C83D-1275-4F7F-A79A-74D1C05EDCEA}"/>
+                <a16:creationId xmlns:a16="http://schemas.microsoft.com/office/drawing/2014/main" id="{21D2AE1A-126E-404D-AA9D-C39BFA7C5DDA}"/>
               </a:ext>
             </a:extLst>
           </p:cNvPr>
@@ -6535,32 +7029,36 @@
         </p:nvSpPr>
         <p:spPr>
           <a:xfrm>
-            <a:off x="1371600" y="2592926"/>
-            <a:ext cx="5062024" cy="1985084"/>
-          </a:xfrm>
-        </p:spPr>
-        <p:txBody>
-          <a:bodyPr>
-            <a:normAutofit/>
-          </a:bodyPr>
+            <a:off x="1467828" y="1607288"/>
+            <a:ext cx="9601200" cy="3419658"/>
+          </a:xfrm>
+        </p:spPr>
+        <p:txBody>
+          <a:bodyPr/>
           <a:lstStyle/>
           <a:p>
             <a:r>
               <a:rPr lang="en-US" sz="2400" dirty="0"/>
-              <a:t>Used 0.33 Test-to-Train ratio</a:t>
+              <a:t>Comparative Study - Submitted to ICCES 2020 (Under Review)</a:t>
             </a:r>
           </a:p>
           <a:p>
             <a:r>
               <a:rPr lang="en-US" sz="2400" dirty="0"/>
-              <a:t>3 Nearest Neighbors</a:t>
+              <a:t>Online Prediction Intrusion Detection System</a:t>
             </a:r>
           </a:p>
           <a:p>
             <a:r>
               <a:rPr lang="en-US" sz="2400" dirty="0"/>
-              <a:t>10% of KDD-99 Dataset</a:t>
-            </a:r>
+              <a:t>Providing a suitable dataset for real-world IDS application</a:t>
+            </a:r>
+          </a:p>
+          <a:p>
+            <a:endParaRPr lang="en-US" dirty="0"/>
+          </a:p>
+          <a:p>
+            <a:endParaRPr lang="en-US" dirty="0"/>
           </a:p>
         </p:txBody>
       </p:sp>
@@ -6569,7 +7067,7 @@
           <p:cNvPr id="4" name="Slide Number Placeholder 3">
             <a:extLst>
               <a:ext uri="{FF2B5EF4-FFF2-40B4-BE49-F238E27FC236}">
-                <a16:creationId xmlns:a16="http://schemas.microsoft.com/office/drawing/2014/main" id="{FA71D55F-38EB-4A80-98E2-872986716F64}"/>
+                <a16:creationId xmlns:a16="http://schemas.microsoft.com/office/drawing/2014/main" id="{24C3C5F2-149E-493B-BD2E-633BBA52B510}"/>
               </a:ext>
             </a:extLst>
           </p:cNvPr>
@@ -6593,59 +7091,12 @@
           </a:p>
         </p:txBody>
       </p:sp>
-      <p:sp>
-        <p:nvSpPr>
-          <p:cNvPr id="6" name="TextBox 5">
-            <a:extLst>
-              <a:ext uri="{FF2B5EF4-FFF2-40B4-BE49-F238E27FC236}">
-                <a16:creationId xmlns:a16="http://schemas.microsoft.com/office/drawing/2014/main" id="{FA46D57D-3115-453C-8D5F-D3D42251DA26}"/>
-              </a:ext>
-            </a:extLst>
-          </p:cNvPr>
-          <p:cNvSpPr txBox="1"/>
-          <p:nvPr/>
-        </p:nvSpPr>
-        <p:spPr>
-          <a:xfrm>
-            <a:off x="6783743" y="5331040"/>
-            <a:ext cx="3130821" cy="923330"/>
-          </a:xfrm>
-          <a:prstGeom prst="rect">
-            <a:avLst/>
-          </a:prstGeom>
-          <a:noFill/>
-        </p:spPr>
-        <p:txBody>
-          <a:bodyPr wrap="square" rtlCol="0">
-            <a:spAutoFit/>
-          </a:bodyPr>
-          <a:lstStyle/>
-          <a:p>
-            <a:r>
-              <a:rPr lang="en-US" dirty="0"/>
-              <a:t>Training Time: 139 seconds</a:t>
-            </a:r>
-          </a:p>
-          <a:p>
-            <a:r>
-              <a:rPr lang="en-US" dirty="0"/>
-              <a:t>Testing Time: 281 seconds</a:t>
-            </a:r>
-          </a:p>
-          <a:p>
-            <a:r>
-              <a:rPr lang="en-US" dirty="0"/>
-              <a:t>Accuracy: 99.9%</a:t>
-            </a:r>
-          </a:p>
-        </p:txBody>
-      </p:sp>
       <p:pic>
         <p:nvPicPr>
-          <p:cNvPr id="7" name="Picture 6">
-            <a:extLst>
-              <a:ext uri="{FF2B5EF4-FFF2-40B4-BE49-F238E27FC236}">
-                <a16:creationId xmlns:a16="http://schemas.microsoft.com/office/drawing/2014/main" id="{41D846A5-DA23-4B9A-AA53-96796EEE54E3}"/>
+          <p:cNvPr id="6" name="Picture 5" descr="Logo&#10;&#10;Description automatically generated">
+            <a:extLst>
+              <a:ext uri="{FF2B5EF4-FFF2-40B4-BE49-F238E27FC236}">
+                <a16:creationId xmlns:a16="http://schemas.microsoft.com/office/drawing/2014/main" id="{4BFFA7FB-E7FE-4110-9C60-A8636AD9C890}"/>
               </a:ext>
             </a:extLst>
           </p:cNvPr>
@@ -6662,8 +7113,8 @@
         </p:blipFill>
         <p:spPr>
           <a:xfrm>
-            <a:off x="6783743" y="2158188"/>
-            <a:ext cx="5062024" cy="2588974"/>
+            <a:off x="8514334" y="5026945"/>
+            <a:ext cx="1596292" cy="1596292"/>
           </a:xfrm>
           <a:prstGeom prst="rect">
             <a:avLst/>
@@ -6672,10 +7123,39 @@
       </p:pic>
       <p:pic>
         <p:nvPicPr>
-          <p:cNvPr id="8" name="Picture 7">
-            <a:extLst>
-              <a:ext uri="{FF2B5EF4-FFF2-40B4-BE49-F238E27FC236}">
-                <a16:creationId xmlns:a16="http://schemas.microsoft.com/office/drawing/2014/main" id="{CFB41A24-1876-4922-88D6-63321AAC6807}"/>
+          <p:cNvPr id="10" name="Picture 9" descr="Text&#10;&#10;Description automatically generated">
+            <a:extLst>
+              <a:ext uri="{FF2B5EF4-FFF2-40B4-BE49-F238E27FC236}">
+                <a16:creationId xmlns:a16="http://schemas.microsoft.com/office/drawing/2014/main" id="{5BE84A3A-8889-46C5-B625-5C57A438C6F8}"/>
+              </a:ext>
+            </a:extLst>
+          </p:cNvPr>
+          <p:cNvPicPr>
+            <a:picLocks noChangeAspect="1"/>
+          </p:cNvPicPr>
+          <p:nvPr/>
+        </p:nvPicPr>
+        <p:blipFill rotWithShape="1">
+          <a:blip r:embed="rId3"/>
+          <a:srcRect r="42390"/>
+          <a:stretch/>
+        </p:blipFill>
+        <p:spPr>
+          <a:xfrm>
+            <a:off x="4821724" y="5026945"/>
+            <a:ext cx="2388295" cy="1596293"/>
+          </a:xfrm>
+          <a:prstGeom prst="rect">
+            <a:avLst/>
+          </a:prstGeom>
+        </p:spPr>
+      </p:pic>
+      <p:pic>
+        <p:nvPicPr>
+          <p:cNvPr id="12" name="Picture 11" descr="Logo&#10;&#10;Description automatically generated">
+            <a:extLst>
+              <a:ext uri="{FF2B5EF4-FFF2-40B4-BE49-F238E27FC236}">
+                <a16:creationId xmlns:a16="http://schemas.microsoft.com/office/drawing/2014/main" id="{56BAA1FD-1F02-4F8C-96FF-9E28F4C0365C}"/>
               </a:ext>
             </a:extLst>
           </p:cNvPr>
@@ -6685,79 +7165,25 @@
           <p:nvPr/>
         </p:nvPicPr>
         <p:blipFill>
-          <a:blip r:embed="rId3"/>
+          <a:blip r:embed="rId4"/>
           <a:stretch>
             <a:fillRect/>
           </a:stretch>
         </p:blipFill>
         <p:spPr>
           <a:xfrm>
-            <a:off x="6783743" y="4796987"/>
-            <a:ext cx="2815276" cy="484228"/>
+            <a:off x="1921117" y="5059401"/>
+            <a:ext cx="1596292" cy="1596292"/>
           </a:xfrm>
           <a:prstGeom prst="rect">
             <a:avLst/>
           </a:prstGeom>
         </p:spPr>
       </p:pic>
-      <p:sp>
-        <p:nvSpPr>
-          <p:cNvPr id="12" name="Title 1">
-            <a:extLst>
-              <a:ext uri="{FF2B5EF4-FFF2-40B4-BE49-F238E27FC236}">
-                <a16:creationId xmlns:a16="http://schemas.microsoft.com/office/drawing/2014/main" id="{E905192A-9A31-4A10-96D3-AE8E064D6E3F}"/>
-              </a:ext>
-            </a:extLst>
-          </p:cNvPr>
-          <p:cNvSpPr txBox="1">
-            <a:spLocks/>
-          </p:cNvSpPr>
-          <p:nvPr/>
-        </p:nvSpPr>
-        <p:spPr>
-          <a:xfrm>
-            <a:off x="1371600" y="1926109"/>
-            <a:ext cx="3849094" cy="464158"/>
-          </a:xfrm>
-          <a:prstGeom prst="rect">
-            <a:avLst/>
-          </a:prstGeom>
-        </p:spPr>
-        <p:txBody>
-          <a:bodyPr vert="horz" lIns="91440" tIns="45720" rIns="91440" bIns="45720" rtlCol="0" anchor="t">
-            <a:normAutofit fontScale="92500" lnSpcReduction="10000"/>
-          </a:bodyPr>
-          <a:lstStyle>
-            <a:lvl1pPr algn="l" defTabSz="914400" rtl="0" eaLnBrk="1" latinLnBrk="0" hangingPunct="1">
-              <a:lnSpc>
-                <a:spcPct val="89000"/>
-              </a:lnSpc>
-              <a:spcBef>
-                <a:spcPct val="0"/>
-              </a:spcBef>
-              <a:buNone/>
-              <a:defRPr sz="4400" kern="1200" baseline="0">
-                <a:solidFill>
-                  <a:schemeClr val="tx2"/>
-                </a:solidFill>
-                <a:latin typeface="+mj-lt"/>
-                <a:ea typeface="+mj-ea"/>
-                <a:cs typeface="+mj-cs"/>
-              </a:defRPr>
-            </a:lvl1pPr>
-          </a:lstStyle>
-          <a:p>
-            <a:r>
-              <a:rPr lang="en-US" sz="3200" dirty="0"/>
-              <a:t>K-Nearest Neighbors:</a:t>
-            </a:r>
-          </a:p>
-        </p:txBody>
-      </p:sp>
     </p:spTree>
     <p:extLst>
       <p:ext uri="{BB962C8B-B14F-4D97-AF65-F5344CB8AC3E}">
-        <p14:creationId xmlns:p14="http://schemas.microsoft.com/office/powerpoint/2010/main" val="2592701822"/>
+        <p14:creationId xmlns:p14="http://schemas.microsoft.com/office/powerpoint/2010/main" val="798270477"/>
       </p:ext>
     </p:extLst>
   </p:cSld>
@@ -6789,7 +7215,7 @@
           <p:cNvPr id="2" name="Title 1">
             <a:extLst>
               <a:ext uri="{FF2B5EF4-FFF2-40B4-BE49-F238E27FC236}">
-                <a16:creationId xmlns:a16="http://schemas.microsoft.com/office/drawing/2014/main" id="{91582333-D57C-409C-9700-B3C0721E4DB2}"/>
+                <a16:creationId xmlns:a16="http://schemas.microsoft.com/office/drawing/2014/main" id="{1090ACDA-DA61-4BAC-8AAF-6455BC3D1C64}"/>
               </a:ext>
             </a:extLst>
           </p:cNvPr>
@@ -6800,80 +7226,14 @@
             <p:ph type="title"/>
           </p:nvPr>
         </p:nvSpPr>
-        <p:spPr>
-          <a:xfrm>
-            <a:off x="1371600" y="685800"/>
-            <a:ext cx="9601200" cy="689776"/>
-          </a:xfrm>
-        </p:spPr>
+        <p:spPr/>
         <p:txBody>
           <a:bodyPr/>
           <a:lstStyle/>
           <a:p>
             <a:r>
               <a:rPr lang="en-US" dirty="0"/>
-              <a:t>User Interface:</a:t>
-            </a:r>
-          </a:p>
-        </p:txBody>
-      </p:sp>
-      <p:sp>
-        <p:nvSpPr>
-          <p:cNvPr id="3" name="Content Placeholder 2">
-            <a:extLst>
-              <a:ext uri="{FF2B5EF4-FFF2-40B4-BE49-F238E27FC236}">
-                <a16:creationId xmlns:a16="http://schemas.microsoft.com/office/drawing/2014/main" id="{28A56A07-10D4-44C1-83F6-A5435775971B}"/>
-              </a:ext>
-            </a:extLst>
-          </p:cNvPr>
-          <p:cNvSpPr>
-            <a:spLocks noGrp="1"/>
-          </p:cNvSpPr>
-          <p:nvPr>
-            <p:ph idx="1"/>
-          </p:nvPr>
-        </p:nvSpPr>
-        <p:spPr>
-          <a:xfrm>
-            <a:off x="1371600" y="1431235"/>
-            <a:ext cx="9601200" cy="1997765"/>
-          </a:xfrm>
-        </p:spPr>
-        <p:txBody>
-          <a:bodyPr/>
-          <a:lstStyle/>
-          <a:p>
-            <a:r>
-              <a:rPr lang="en-US" dirty="0"/>
-              <a:t>The users of the system can be multi-levels:</a:t>
-            </a:r>
-          </a:p>
-          <a:p>
-            <a:pPr lvl="1"/>
-            <a:r>
-              <a:rPr lang="en-US" dirty="0"/>
-              <a:t>System Administrators</a:t>
-            </a:r>
-          </a:p>
-          <a:p>
-            <a:pPr lvl="1"/>
-            <a:r>
-              <a:rPr lang="en-US" dirty="0"/>
-              <a:t>General Audience Individuals</a:t>
-            </a:r>
-          </a:p>
-          <a:p>
-            <a:pPr lvl="1"/>
-            <a:r>
-              <a:rPr lang="en-US" dirty="0"/>
-              <a:t>Security Engineers testing attacks</a:t>
-            </a:r>
-          </a:p>
-          <a:p>
-            <a:pPr lvl="1"/>
-            <a:r>
-              <a:rPr lang="en-US" dirty="0"/>
-              <a:t>Governmental Agencies taking security measures</a:t>
+              <a:t>Appendix</a:t>
             </a:r>
           </a:p>
         </p:txBody>
@@ -6883,7 +7243,7 @@
           <p:cNvPr id="4" name="Slide Number Placeholder 3">
             <a:extLst>
               <a:ext uri="{FF2B5EF4-FFF2-40B4-BE49-F238E27FC236}">
-                <a16:creationId xmlns:a16="http://schemas.microsoft.com/office/drawing/2014/main" id="{0B483C04-466F-499D-A85C-A1B3EAC844FA}"/>
+                <a16:creationId xmlns:a16="http://schemas.microsoft.com/office/drawing/2014/main" id="{3A2EFD22-38DA-4CDA-8B31-1C4167613B8B}"/>
               </a:ext>
             </a:extLst>
           </p:cNvPr>
@@ -6907,279 +7267,10 @@
           </a:p>
         </p:txBody>
       </p:sp>
-      <p:sp>
-        <p:nvSpPr>
-          <p:cNvPr id="5" name="Content Placeholder 2">
-            <a:extLst>
-              <a:ext uri="{FF2B5EF4-FFF2-40B4-BE49-F238E27FC236}">
-                <a16:creationId xmlns:a16="http://schemas.microsoft.com/office/drawing/2014/main" id="{64F0188F-A50A-4DDB-9D4A-4FAFF652CBD0}"/>
-              </a:ext>
-            </a:extLst>
-          </p:cNvPr>
-          <p:cNvSpPr txBox="1">
-            <a:spLocks/>
-          </p:cNvSpPr>
-          <p:nvPr/>
-        </p:nvSpPr>
-        <p:spPr>
-          <a:xfrm>
-            <a:off x="1371600" y="3706633"/>
-            <a:ext cx="9601200" cy="2746753"/>
-          </a:xfrm>
-          <a:prstGeom prst="rect">
-            <a:avLst/>
-          </a:prstGeom>
-        </p:spPr>
-        <p:txBody>
-          <a:bodyPr vert="horz" lIns="91440" tIns="45720" rIns="91440" bIns="45720" rtlCol="0">
-            <a:normAutofit/>
-          </a:bodyPr>
-          <a:lstStyle>
-            <a:lvl1pPr marL="384048" indent="-384048" algn="l" defTabSz="914400" rtl="0" eaLnBrk="1" latinLnBrk="0" hangingPunct="1">
-              <a:lnSpc>
-                <a:spcPct val="94000"/>
-              </a:lnSpc>
-              <a:spcBef>
-                <a:spcPts val="1000"/>
-              </a:spcBef>
-              <a:spcAft>
-                <a:spcPts val="200"/>
-              </a:spcAft>
-              <a:buFont typeface="Franklin Gothic Book" panose="020B0503020102020204" pitchFamily="34" charset="0"/>
-              <a:buChar char="■"/>
-              <a:defRPr sz="2000" kern="1200" baseline="0">
-                <a:solidFill>
-                  <a:schemeClr val="tx2"/>
-                </a:solidFill>
-                <a:latin typeface="+mn-lt"/>
-                <a:ea typeface="+mn-ea"/>
-                <a:cs typeface="+mn-cs"/>
-              </a:defRPr>
-            </a:lvl1pPr>
-            <a:lvl2pPr marL="914400" indent="-384048" algn="l" defTabSz="914400" rtl="0" eaLnBrk="1" latinLnBrk="0" hangingPunct="1">
-              <a:lnSpc>
-                <a:spcPct val="94000"/>
-              </a:lnSpc>
-              <a:spcBef>
-                <a:spcPts val="500"/>
-              </a:spcBef>
-              <a:spcAft>
-                <a:spcPts val="200"/>
-              </a:spcAft>
-              <a:buFont typeface="Franklin Gothic Book" panose="020B0503020102020204" pitchFamily="34" charset="0"/>
-              <a:buChar char="–"/>
-              <a:defRPr sz="2000" i="1" kern="1200" baseline="0">
-                <a:solidFill>
-                  <a:schemeClr val="tx2"/>
-                </a:solidFill>
-                <a:latin typeface="+mn-lt"/>
-                <a:ea typeface="+mn-ea"/>
-                <a:cs typeface="+mn-cs"/>
-              </a:defRPr>
-            </a:lvl2pPr>
-            <a:lvl3pPr marL="1371600" indent="-384048" algn="l" defTabSz="914400" rtl="0" eaLnBrk="1" latinLnBrk="0" hangingPunct="1">
-              <a:lnSpc>
-                <a:spcPct val="94000"/>
-              </a:lnSpc>
-              <a:spcBef>
-                <a:spcPts val="500"/>
-              </a:spcBef>
-              <a:spcAft>
-                <a:spcPts val="200"/>
-              </a:spcAft>
-              <a:buFont typeface="Franklin Gothic Book" panose="020B0503020102020204" pitchFamily="34" charset="0"/>
-              <a:buChar char="■"/>
-              <a:defRPr sz="1800" kern="1200" baseline="0">
-                <a:solidFill>
-                  <a:schemeClr val="tx2"/>
-                </a:solidFill>
-                <a:latin typeface="+mn-lt"/>
-                <a:ea typeface="+mn-ea"/>
-                <a:cs typeface="+mn-cs"/>
-              </a:defRPr>
-            </a:lvl3pPr>
-            <a:lvl4pPr marL="1828800" indent="-384048" algn="l" defTabSz="914400" rtl="0" eaLnBrk="1" latinLnBrk="0" hangingPunct="1">
-              <a:lnSpc>
-                <a:spcPct val="94000"/>
-              </a:lnSpc>
-              <a:spcBef>
-                <a:spcPts val="500"/>
-              </a:spcBef>
-              <a:spcAft>
-                <a:spcPts val="200"/>
-              </a:spcAft>
-              <a:buFont typeface="Franklin Gothic Book" panose="020B0503020102020204" pitchFamily="34" charset="0"/>
-              <a:buChar char="–"/>
-              <a:defRPr sz="1800" i="1" kern="1200" baseline="0">
-                <a:solidFill>
-                  <a:schemeClr val="tx2"/>
-                </a:solidFill>
-                <a:latin typeface="+mn-lt"/>
-                <a:ea typeface="+mn-ea"/>
-                <a:cs typeface="+mn-cs"/>
-              </a:defRPr>
-            </a:lvl4pPr>
-            <a:lvl5pPr marL="2286000" indent="-384048" algn="l" defTabSz="914400" rtl="0" eaLnBrk="1" latinLnBrk="0" hangingPunct="1">
-              <a:lnSpc>
-                <a:spcPct val="94000"/>
-              </a:lnSpc>
-              <a:spcBef>
-                <a:spcPts val="500"/>
-              </a:spcBef>
-              <a:spcAft>
-                <a:spcPts val="200"/>
-              </a:spcAft>
-              <a:buFont typeface="Franklin Gothic Book" panose="020B0503020102020204" pitchFamily="34" charset="0"/>
-              <a:buChar char="■"/>
-              <a:defRPr sz="1600" kern="1200" baseline="0">
-                <a:solidFill>
-                  <a:schemeClr val="tx2"/>
-                </a:solidFill>
-                <a:latin typeface="+mn-lt"/>
-                <a:ea typeface="+mn-ea"/>
-                <a:cs typeface="+mn-cs"/>
-              </a:defRPr>
-            </a:lvl5pPr>
-            <a:lvl6pPr marL="2743200" indent="-384048" algn="l" defTabSz="914400" rtl="0" eaLnBrk="1" latinLnBrk="0" hangingPunct="1">
-              <a:lnSpc>
-                <a:spcPct val="94000"/>
-              </a:lnSpc>
-              <a:spcBef>
-                <a:spcPts val="500"/>
-              </a:spcBef>
-              <a:spcAft>
-                <a:spcPts val="200"/>
-              </a:spcAft>
-              <a:buFont typeface="Franklin Gothic Book" panose="020B0503020102020204" pitchFamily="34" charset="0"/>
-              <a:buChar char="–"/>
-              <a:defRPr sz="1600" i="1" kern="1200" baseline="0">
-                <a:solidFill>
-                  <a:schemeClr val="tx2"/>
-                </a:solidFill>
-                <a:latin typeface="+mn-lt"/>
-                <a:ea typeface="+mn-ea"/>
-                <a:cs typeface="+mn-cs"/>
-              </a:defRPr>
-            </a:lvl6pPr>
-            <a:lvl7pPr marL="3200400" indent="-384048" algn="l" defTabSz="914400" rtl="0" eaLnBrk="1" latinLnBrk="0" hangingPunct="1">
-              <a:lnSpc>
-                <a:spcPct val="94000"/>
-              </a:lnSpc>
-              <a:spcBef>
-                <a:spcPts val="500"/>
-              </a:spcBef>
-              <a:spcAft>
-                <a:spcPts val="200"/>
-              </a:spcAft>
-              <a:buFont typeface="Franklin Gothic Book" panose="020B0503020102020204" pitchFamily="34" charset="0"/>
-              <a:buChar char="■"/>
-              <a:defRPr sz="1400" kern="1200" baseline="0">
-                <a:solidFill>
-                  <a:schemeClr val="tx2"/>
-                </a:solidFill>
-                <a:latin typeface="+mn-lt"/>
-                <a:ea typeface="+mn-ea"/>
-                <a:cs typeface="+mn-cs"/>
-              </a:defRPr>
-            </a:lvl7pPr>
-            <a:lvl8pPr marL="3657600" indent="-384048" algn="l" defTabSz="914400" rtl="0" eaLnBrk="1" latinLnBrk="0" hangingPunct="1">
-              <a:lnSpc>
-                <a:spcPct val="94000"/>
-              </a:lnSpc>
-              <a:spcBef>
-                <a:spcPts val="500"/>
-              </a:spcBef>
-              <a:spcAft>
-                <a:spcPts val="200"/>
-              </a:spcAft>
-              <a:buFont typeface="Franklin Gothic Book" panose="020B0503020102020204" pitchFamily="34" charset="0"/>
-              <a:buChar char="–"/>
-              <a:defRPr sz="1400" i="1" kern="1200" baseline="0">
-                <a:solidFill>
-                  <a:schemeClr val="tx2"/>
-                </a:solidFill>
-                <a:latin typeface="+mn-lt"/>
-                <a:ea typeface="+mn-ea"/>
-                <a:cs typeface="+mn-cs"/>
-              </a:defRPr>
-            </a:lvl8pPr>
-            <a:lvl9pPr marL="4114800" indent="-384048" algn="l" defTabSz="914400" rtl="0" eaLnBrk="1" latinLnBrk="0" hangingPunct="1">
-              <a:lnSpc>
-                <a:spcPct val="94000"/>
-              </a:lnSpc>
-              <a:spcBef>
-                <a:spcPts val="500"/>
-              </a:spcBef>
-              <a:spcAft>
-                <a:spcPts val="200"/>
-              </a:spcAft>
-              <a:buFont typeface="Franklin Gothic Book" panose="020B0503020102020204" pitchFamily="34" charset="0"/>
-              <a:buChar char="■"/>
-              <a:defRPr sz="1400" kern="1200" baseline="0">
-                <a:solidFill>
-                  <a:schemeClr val="tx2"/>
-                </a:solidFill>
-                <a:latin typeface="+mn-lt"/>
-                <a:ea typeface="+mn-ea"/>
-                <a:cs typeface="+mn-cs"/>
-              </a:defRPr>
-            </a:lvl9pPr>
-          </a:lstStyle>
-          <a:p>
-            <a:r>
-              <a:rPr lang="en-US" dirty="0"/>
-              <a:t>Interface shall preview reports including:</a:t>
-            </a:r>
-          </a:p>
-          <a:p>
-            <a:pPr lvl="1"/>
-            <a:r>
-              <a:rPr lang="en-US" dirty="0"/>
-              <a:t>Normal/Attack packets</a:t>
-            </a:r>
-          </a:p>
-          <a:p>
-            <a:pPr lvl="1"/>
-            <a:r>
-              <a:rPr lang="en-US" dirty="0"/>
-              <a:t>Type of attack in packet</a:t>
-            </a:r>
-          </a:p>
-          <a:p>
-            <a:pPr lvl="1"/>
-            <a:r>
-              <a:rPr lang="en-US" dirty="0"/>
-              <a:t>Time and frequency of attacks</a:t>
-            </a:r>
-          </a:p>
-          <a:p>
-            <a:pPr lvl="1"/>
-            <a:r>
-              <a:rPr lang="en-US" dirty="0"/>
-              <a:t>Trends in attack frequency</a:t>
-            </a:r>
-          </a:p>
-          <a:p>
-            <a:pPr lvl="1"/>
-            <a:r>
-              <a:rPr lang="en-US" dirty="0"/>
-              <a:t>Usual attack sources</a:t>
-            </a:r>
-          </a:p>
-          <a:p>
-            <a:pPr lvl="1"/>
-            <a:endParaRPr lang="en-US" dirty="0"/>
-          </a:p>
-          <a:p>
-            <a:pPr lvl="1"/>
-            <a:endParaRPr lang="en-US" dirty="0"/>
-          </a:p>
-        </p:txBody>
-      </p:sp>
     </p:spTree>
     <p:extLst>
       <p:ext uri="{BB962C8B-B14F-4D97-AF65-F5344CB8AC3E}">
-        <p14:creationId xmlns:p14="http://schemas.microsoft.com/office/powerpoint/2010/main" val="1695136661"/>
+        <p14:creationId xmlns:p14="http://schemas.microsoft.com/office/powerpoint/2010/main" val="979330142"/>
       </p:ext>
     </p:extLst>
   </p:cSld>
@@ -7421,6 +7512,602 @@
 </file>
 
 <file path=ppt/slides/slide20.xml><?xml version="1.0" encoding="utf-8"?>
+<p:sld xmlns:a="http://schemas.openxmlformats.org/drawingml/2006/main" xmlns:r="http://schemas.openxmlformats.org/officeDocument/2006/relationships" xmlns:p="http://schemas.openxmlformats.org/presentationml/2006/main">
+  <p:cSld>
+    <p:spTree>
+      <p:nvGrpSpPr>
+        <p:cNvPr id="1" name=""/>
+        <p:cNvGrpSpPr/>
+        <p:nvPr/>
+      </p:nvGrpSpPr>
+      <p:grpSpPr>
+        <a:xfrm>
+          <a:off x="0" y="0"/>
+          <a:ext cx="0" cy="0"/>
+          <a:chOff x="0" y="0"/>
+          <a:chExt cx="0" cy="0"/>
+        </a:xfrm>
+      </p:grpSpPr>
+      <p:sp>
+        <p:nvSpPr>
+          <p:cNvPr id="2" name="Title 1">
+            <a:extLst>
+              <a:ext uri="{FF2B5EF4-FFF2-40B4-BE49-F238E27FC236}">
+                <a16:creationId xmlns:a16="http://schemas.microsoft.com/office/drawing/2014/main" id="{A321EBDA-AD78-4909-9669-C65C61C9CCB5}"/>
+              </a:ext>
+            </a:extLst>
+          </p:cNvPr>
+          <p:cNvSpPr>
+            <a:spLocks noGrp="1"/>
+          </p:cNvSpPr>
+          <p:nvPr>
+            <p:ph type="title"/>
+          </p:nvPr>
+        </p:nvSpPr>
+        <p:spPr>
+          <a:xfrm>
+            <a:off x="1371600" y="685800"/>
+            <a:ext cx="9601200" cy="928315"/>
+          </a:xfrm>
+        </p:spPr>
+        <p:txBody>
+          <a:bodyPr/>
+          <a:lstStyle/>
+          <a:p>
+            <a:r>
+              <a:rPr lang="en-US" dirty="0"/>
+              <a:t>K-Nearest Neighbor Classifier</a:t>
+            </a:r>
+          </a:p>
+        </p:txBody>
+      </p:sp>
+      <p:sp>
+        <p:nvSpPr>
+          <p:cNvPr id="3" name="Content Placeholder 2">
+            <a:extLst>
+              <a:ext uri="{FF2B5EF4-FFF2-40B4-BE49-F238E27FC236}">
+                <a16:creationId xmlns:a16="http://schemas.microsoft.com/office/drawing/2014/main" id="{F027C83D-1275-4F7F-A79A-74D1C05EDCEA}"/>
+              </a:ext>
+            </a:extLst>
+          </p:cNvPr>
+          <p:cNvSpPr>
+            <a:spLocks noGrp="1"/>
+          </p:cNvSpPr>
+          <p:nvPr>
+            <p:ph idx="1"/>
+          </p:nvPr>
+        </p:nvSpPr>
+        <p:spPr>
+          <a:xfrm>
+            <a:off x="1371600" y="1839401"/>
+            <a:ext cx="6238765" cy="4499776"/>
+          </a:xfrm>
+        </p:spPr>
+        <p:txBody>
+          <a:bodyPr>
+            <a:normAutofit/>
+          </a:bodyPr>
+          <a:lstStyle/>
+          <a:p>
+            <a:r>
+              <a:rPr lang="en-US" sz="2400" dirty="0"/>
+              <a:t>Supervised learning model</a:t>
+            </a:r>
+          </a:p>
+          <a:p>
+            <a:r>
+              <a:rPr lang="en-US" sz="2400" dirty="0"/>
+              <a:t>Uses k-closest training samples in feature space</a:t>
+            </a:r>
+          </a:p>
+          <a:p>
+            <a:r>
+              <a:rPr lang="en-US" sz="2400" dirty="0"/>
+              <a:t>Known as Lazy Learning model</a:t>
+            </a:r>
+          </a:p>
+        </p:txBody>
+      </p:sp>
+      <p:sp>
+        <p:nvSpPr>
+          <p:cNvPr id="4" name="Slide Number Placeholder 3">
+            <a:extLst>
+              <a:ext uri="{FF2B5EF4-FFF2-40B4-BE49-F238E27FC236}">
+                <a16:creationId xmlns:a16="http://schemas.microsoft.com/office/drawing/2014/main" id="{FA71D55F-38EB-4A80-98E2-872986716F64}"/>
+              </a:ext>
+            </a:extLst>
+          </p:cNvPr>
+          <p:cNvSpPr>
+            <a:spLocks noGrp="1"/>
+          </p:cNvSpPr>
+          <p:nvPr>
+            <p:ph type="sldNum" sz="quarter" idx="12"/>
+          </p:nvPr>
+        </p:nvSpPr>
+        <p:spPr/>
+        <p:txBody>
+          <a:bodyPr/>
+          <a:lstStyle/>
+          <a:p>
+            <a:fld id="{69E57DC2-970A-4B3E-BB1C-7A09969E49DF}" type="slidenum">
+              <a:rPr lang="en-US" smtClean="0"/>
+              <a:t>20</a:t>
+            </a:fld>
+            <a:endParaRPr lang="en-US" dirty="0"/>
+          </a:p>
+        </p:txBody>
+      </p:sp>
+      <p:pic>
+        <p:nvPicPr>
+          <p:cNvPr id="7" name="Picture 6">
+            <a:extLst>
+              <a:ext uri="{FF2B5EF4-FFF2-40B4-BE49-F238E27FC236}">
+                <a16:creationId xmlns:a16="http://schemas.microsoft.com/office/drawing/2014/main" id="{0AE03EB1-E3F2-4F35-932D-A7A45D48B106}"/>
+              </a:ext>
+            </a:extLst>
+          </p:cNvPr>
+          <p:cNvPicPr>
+            <a:picLocks noChangeAspect="1"/>
+          </p:cNvPicPr>
+          <p:nvPr/>
+        </p:nvPicPr>
+        <p:blipFill>
+          <a:blip r:embed="rId2"/>
+          <a:stretch>
+            <a:fillRect/>
+          </a:stretch>
+        </p:blipFill>
+        <p:spPr>
+          <a:xfrm>
+            <a:off x="7717150" y="1839401"/>
+            <a:ext cx="4282297" cy="3329485"/>
+          </a:xfrm>
+          <a:prstGeom prst="rect">
+            <a:avLst/>
+          </a:prstGeom>
+        </p:spPr>
+      </p:pic>
+    </p:spTree>
+    <p:extLst>
+      <p:ext uri="{BB962C8B-B14F-4D97-AF65-F5344CB8AC3E}">
+        <p14:creationId xmlns:p14="http://schemas.microsoft.com/office/powerpoint/2010/main" val="4194411716"/>
+      </p:ext>
+    </p:extLst>
+  </p:cSld>
+  <p:clrMapOvr>
+    <a:masterClrMapping/>
+  </p:clrMapOvr>
+</p:sld>
+</file>
+
+<file path=ppt/slides/slide21.xml><?xml version="1.0" encoding="utf-8"?>
+<p:sld xmlns:a="http://schemas.openxmlformats.org/drawingml/2006/main" xmlns:r="http://schemas.openxmlformats.org/officeDocument/2006/relationships" xmlns:p="http://schemas.openxmlformats.org/presentationml/2006/main">
+  <p:cSld>
+    <p:spTree>
+      <p:nvGrpSpPr>
+        <p:cNvPr id="1" name=""/>
+        <p:cNvGrpSpPr/>
+        <p:nvPr/>
+      </p:nvGrpSpPr>
+      <p:grpSpPr>
+        <a:xfrm>
+          <a:off x="0" y="0"/>
+          <a:ext cx="0" cy="0"/>
+          <a:chOff x="0" y="0"/>
+          <a:chExt cx="0" cy="0"/>
+        </a:xfrm>
+      </p:grpSpPr>
+      <p:sp>
+        <p:nvSpPr>
+          <p:cNvPr id="2" name="Title 1">
+            <a:extLst>
+              <a:ext uri="{FF2B5EF4-FFF2-40B4-BE49-F238E27FC236}">
+                <a16:creationId xmlns:a16="http://schemas.microsoft.com/office/drawing/2014/main" id="{A321EBDA-AD78-4909-9669-C65C61C9CCB5}"/>
+              </a:ext>
+            </a:extLst>
+          </p:cNvPr>
+          <p:cNvSpPr>
+            <a:spLocks noGrp="1"/>
+          </p:cNvSpPr>
+          <p:nvPr>
+            <p:ph type="title"/>
+          </p:nvPr>
+        </p:nvSpPr>
+        <p:spPr>
+          <a:xfrm>
+            <a:off x="1371600" y="685800"/>
+            <a:ext cx="9601200" cy="928315"/>
+          </a:xfrm>
+        </p:spPr>
+        <p:txBody>
+          <a:bodyPr/>
+          <a:lstStyle/>
+          <a:p>
+            <a:r>
+              <a:rPr lang="en-US" dirty="0"/>
+              <a:t>Support Vector Machines (SVM)</a:t>
+            </a:r>
+          </a:p>
+        </p:txBody>
+      </p:sp>
+      <p:sp>
+        <p:nvSpPr>
+          <p:cNvPr id="3" name="Content Placeholder 2">
+            <a:extLst>
+              <a:ext uri="{FF2B5EF4-FFF2-40B4-BE49-F238E27FC236}">
+                <a16:creationId xmlns:a16="http://schemas.microsoft.com/office/drawing/2014/main" id="{F027C83D-1275-4F7F-A79A-74D1C05EDCEA}"/>
+              </a:ext>
+            </a:extLst>
+          </p:cNvPr>
+          <p:cNvSpPr>
+            <a:spLocks noGrp="1"/>
+          </p:cNvSpPr>
+          <p:nvPr>
+            <p:ph idx="1"/>
+          </p:nvPr>
+        </p:nvSpPr>
+        <p:spPr>
+          <a:xfrm>
+            <a:off x="1371600" y="1839401"/>
+            <a:ext cx="6238765" cy="4499776"/>
+          </a:xfrm>
+        </p:spPr>
+        <p:txBody>
+          <a:bodyPr>
+            <a:normAutofit/>
+          </a:bodyPr>
+          <a:lstStyle/>
+          <a:p>
+            <a:r>
+              <a:rPr lang="en-US" sz="2400" dirty="0"/>
+              <a:t>Supervised learning model</a:t>
+            </a:r>
+          </a:p>
+          <a:p>
+            <a:r>
+              <a:rPr lang="en-US" sz="2400" dirty="0"/>
+              <a:t>Creates a separating margin for classification</a:t>
+            </a:r>
+          </a:p>
+          <a:p>
+            <a:r>
+              <a:rPr lang="en-US" sz="2400" dirty="0"/>
+              <a:t>New data is classified based on whether it exceeds the determined threshold margin</a:t>
+            </a:r>
+          </a:p>
+        </p:txBody>
+      </p:sp>
+      <p:sp>
+        <p:nvSpPr>
+          <p:cNvPr id="4" name="Slide Number Placeholder 3">
+            <a:extLst>
+              <a:ext uri="{FF2B5EF4-FFF2-40B4-BE49-F238E27FC236}">
+                <a16:creationId xmlns:a16="http://schemas.microsoft.com/office/drawing/2014/main" id="{FA71D55F-38EB-4A80-98E2-872986716F64}"/>
+              </a:ext>
+            </a:extLst>
+          </p:cNvPr>
+          <p:cNvSpPr>
+            <a:spLocks noGrp="1"/>
+          </p:cNvSpPr>
+          <p:nvPr>
+            <p:ph type="sldNum" sz="quarter" idx="12"/>
+          </p:nvPr>
+        </p:nvSpPr>
+        <p:spPr/>
+        <p:txBody>
+          <a:bodyPr/>
+          <a:lstStyle/>
+          <a:p>
+            <a:fld id="{69E57DC2-970A-4B3E-BB1C-7A09969E49DF}" type="slidenum">
+              <a:rPr lang="en-US" smtClean="0"/>
+              <a:t>21</a:t>
+            </a:fld>
+            <a:endParaRPr lang="en-US" dirty="0"/>
+          </a:p>
+        </p:txBody>
+      </p:sp>
+      <p:pic>
+        <p:nvPicPr>
+          <p:cNvPr id="8" name="Picture 7">
+            <a:extLst>
+              <a:ext uri="{FF2B5EF4-FFF2-40B4-BE49-F238E27FC236}">
+                <a16:creationId xmlns:a16="http://schemas.microsoft.com/office/drawing/2014/main" id="{B092E1E5-C0BC-430A-98EA-840FCDB67C1E}"/>
+              </a:ext>
+            </a:extLst>
+          </p:cNvPr>
+          <p:cNvPicPr>
+            <a:picLocks noChangeAspect="1"/>
+          </p:cNvPicPr>
+          <p:nvPr/>
+        </p:nvPicPr>
+        <p:blipFill>
+          <a:blip r:embed="rId2"/>
+          <a:stretch>
+            <a:fillRect/>
+          </a:stretch>
+        </p:blipFill>
+        <p:spPr>
+          <a:xfrm>
+            <a:off x="7763658" y="1577698"/>
+            <a:ext cx="4276127" cy="3702603"/>
+          </a:xfrm>
+          <a:prstGeom prst="rect">
+            <a:avLst/>
+          </a:prstGeom>
+        </p:spPr>
+      </p:pic>
+    </p:spTree>
+    <p:extLst>
+      <p:ext uri="{BB962C8B-B14F-4D97-AF65-F5344CB8AC3E}">
+        <p14:creationId xmlns:p14="http://schemas.microsoft.com/office/powerpoint/2010/main" val="1093773152"/>
+      </p:ext>
+    </p:extLst>
+  </p:cSld>
+  <p:clrMapOvr>
+    <a:masterClrMapping/>
+  </p:clrMapOvr>
+</p:sld>
+</file>
+
+<file path=ppt/slides/slide22.xml><?xml version="1.0" encoding="utf-8"?>
+<p:sld xmlns:a="http://schemas.openxmlformats.org/drawingml/2006/main" xmlns:r="http://schemas.openxmlformats.org/officeDocument/2006/relationships" xmlns:p="http://schemas.openxmlformats.org/presentationml/2006/main">
+  <p:cSld>
+    <p:spTree>
+      <p:nvGrpSpPr>
+        <p:cNvPr id="1" name=""/>
+        <p:cNvGrpSpPr/>
+        <p:nvPr/>
+      </p:nvGrpSpPr>
+      <p:grpSpPr>
+        <a:xfrm>
+          <a:off x="0" y="0"/>
+          <a:ext cx="0" cy="0"/>
+          <a:chOff x="0" y="0"/>
+          <a:chExt cx="0" cy="0"/>
+        </a:xfrm>
+      </p:grpSpPr>
+      <p:sp>
+        <p:nvSpPr>
+          <p:cNvPr id="2" name="Title 1">
+            <a:extLst>
+              <a:ext uri="{FF2B5EF4-FFF2-40B4-BE49-F238E27FC236}">
+                <a16:creationId xmlns:a16="http://schemas.microsoft.com/office/drawing/2014/main" id="{A321EBDA-AD78-4909-9669-C65C61C9CCB5}"/>
+              </a:ext>
+            </a:extLst>
+          </p:cNvPr>
+          <p:cNvSpPr>
+            <a:spLocks noGrp="1"/>
+          </p:cNvSpPr>
+          <p:nvPr>
+            <p:ph type="title"/>
+          </p:nvPr>
+        </p:nvSpPr>
+        <p:spPr>
+          <a:xfrm>
+            <a:off x="1371600" y="685800"/>
+            <a:ext cx="9601200" cy="928315"/>
+          </a:xfrm>
+        </p:spPr>
+        <p:txBody>
+          <a:bodyPr/>
+          <a:lstStyle/>
+          <a:p>
+            <a:r>
+              <a:rPr lang="en-US" dirty="0"/>
+              <a:t>Long Short-term Memory</a:t>
+            </a:r>
+          </a:p>
+        </p:txBody>
+      </p:sp>
+      <p:sp>
+        <p:nvSpPr>
+          <p:cNvPr id="3" name="Content Placeholder 2">
+            <a:extLst>
+              <a:ext uri="{FF2B5EF4-FFF2-40B4-BE49-F238E27FC236}">
+                <a16:creationId xmlns:a16="http://schemas.microsoft.com/office/drawing/2014/main" id="{F027C83D-1275-4F7F-A79A-74D1C05EDCEA}"/>
+              </a:ext>
+            </a:extLst>
+          </p:cNvPr>
+          <p:cNvSpPr>
+            <a:spLocks noGrp="1"/>
+          </p:cNvSpPr>
+          <p:nvPr>
+            <p:ph idx="1"/>
+          </p:nvPr>
+        </p:nvSpPr>
+        <p:spPr>
+          <a:xfrm>
+            <a:off x="1371600" y="1726759"/>
+            <a:ext cx="7843962" cy="1985084"/>
+          </a:xfrm>
+        </p:spPr>
+        <p:txBody>
+          <a:bodyPr>
+            <a:normAutofit/>
+          </a:bodyPr>
+          <a:lstStyle/>
+          <a:p>
+            <a:r>
+              <a:rPr lang="en-US" sz="2400" dirty="0"/>
+              <a:t>A type of Recurrent Neural Network</a:t>
+            </a:r>
+          </a:p>
+          <a:p>
+            <a:r>
+              <a:rPr lang="en-US" sz="2400" dirty="0"/>
+              <a:t>Short-term memory learns short chains of data recurrently</a:t>
+            </a:r>
+          </a:p>
+          <a:p>
+            <a:r>
+              <a:rPr lang="en-US" sz="2400" dirty="0"/>
+              <a:t>Uses Long memory to store learned relevant information</a:t>
+            </a:r>
+          </a:p>
+        </p:txBody>
+      </p:sp>
+      <p:sp>
+        <p:nvSpPr>
+          <p:cNvPr id="4" name="Slide Number Placeholder 3">
+            <a:extLst>
+              <a:ext uri="{FF2B5EF4-FFF2-40B4-BE49-F238E27FC236}">
+                <a16:creationId xmlns:a16="http://schemas.microsoft.com/office/drawing/2014/main" id="{FA71D55F-38EB-4A80-98E2-872986716F64}"/>
+              </a:ext>
+            </a:extLst>
+          </p:cNvPr>
+          <p:cNvSpPr>
+            <a:spLocks noGrp="1"/>
+          </p:cNvSpPr>
+          <p:nvPr>
+            <p:ph type="sldNum" sz="quarter" idx="12"/>
+          </p:nvPr>
+        </p:nvSpPr>
+        <p:spPr/>
+        <p:txBody>
+          <a:bodyPr/>
+          <a:lstStyle/>
+          <a:p>
+            <a:fld id="{69E57DC2-970A-4B3E-BB1C-7A09969E49DF}" type="slidenum">
+              <a:rPr lang="en-US" smtClean="0"/>
+              <a:t>22</a:t>
+            </a:fld>
+            <a:endParaRPr lang="en-US" dirty="0"/>
+          </a:p>
+        </p:txBody>
+      </p:sp>
+      <p:pic>
+        <p:nvPicPr>
+          <p:cNvPr id="5" name="Picture 4">
+            <a:extLst>
+              <a:ext uri="{FF2B5EF4-FFF2-40B4-BE49-F238E27FC236}">
+                <a16:creationId xmlns:a16="http://schemas.microsoft.com/office/drawing/2014/main" id="{9A08613F-13F6-4C8C-BBE1-49E2350FEECB}"/>
+              </a:ext>
+            </a:extLst>
+          </p:cNvPr>
+          <p:cNvPicPr>
+            <a:picLocks noChangeAspect="1"/>
+          </p:cNvPicPr>
+          <p:nvPr/>
+        </p:nvPicPr>
+        <p:blipFill>
+          <a:blip r:embed="rId2"/>
+          <a:stretch>
+            <a:fillRect/>
+          </a:stretch>
+        </p:blipFill>
+        <p:spPr>
+          <a:xfrm>
+            <a:off x="2936625" y="3959659"/>
+            <a:ext cx="6471150" cy="2347713"/>
+          </a:xfrm>
+          <a:prstGeom prst="rect">
+            <a:avLst/>
+          </a:prstGeom>
+        </p:spPr>
+      </p:pic>
+    </p:spTree>
+    <p:extLst>
+      <p:ext uri="{BB962C8B-B14F-4D97-AF65-F5344CB8AC3E}">
+        <p14:creationId xmlns:p14="http://schemas.microsoft.com/office/powerpoint/2010/main" val="3175228227"/>
+      </p:ext>
+    </p:extLst>
+  </p:cSld>
+  <p:clrMapOvr>
+    <a:masterClrMapping/>
+  </p:clrMapOvr>
+</p:sld>
+</file>
+
+<file path=ppt/slides/slide23.xml><?xml version="1.0" encoding="utf-8"?>
+<p:sld xmlns:a="http://schemas.openxmlformats.org/drawingml/2006/main" xmlns:r="http://schemas.openxmlformats.org/officeDocument/2006/relationships" xmlns:p="http://schemas.openxmlformats.org/presentationml/2006/main">
+  <p:cSld>
+    <p:spTree>
+      <p:nvGrpSpPr>
+        <p:cNvPr id="1" name=""/>
+        <p:cNvGrpSpPr/>
+        <p:nvPr/>
+      </p:nvGrpSpPr>
+      <p:grpSpPr>
+        <a:xfrm>
+          <a:off x="0" y="0"/>
+          <a:ext cx="0" cy="0"/>
+          <a:chOff x="0" y="0"/>
+          <a:chExt cx="0" cy="0"/>
+        </a:xfrm>
+      </p:grpSpPr>
+      <p:sp>
+        <p:nvSpPr>
+          <p:cNvPr id="4" name="Slide Number Placeholder 3">
+            <a:extLst>
+              <a:ext uri="{FF2B5EF4-FFF2-40B4-BE49-F238E27FC236}">
+                <a16:creationId xmlns:a16="http://schemas.microsoft.com/office/drawing/2014/main" id="{6BA00015-F557-4277-AC97-F188E4B7936E}"/>
+              </a:ext>
+            </a:extLst>
+          </p:cNvPr>
+          <p:cNvSpPr>
+            <a:spLocks noGrp="1"/>
+          </p:cNvSpPr>
+          <p:nvPr>
+            <p:ph type="sldNum" sz="quarter" idx="12"/>
+          </p:nvPr>
+        </p:nvSpPr>
+        <p:spPr/>
+        <p:txBody>
+          <a:bodyPr/>
+          <a:lstStyle/>
+          <a:p>
+            <a:fld id="{69E57DC2-970A-4B3E-BB1C-7A09969E49DF}" type="slidenum">
+              <a:rPr lang="en-US" smtClean="0"/>
+              <a:t>23</a:t>
+            </a:fld>
+            <a:endParaRPr lang="en-US" dirty="0"/>
+          </a:p>
+        </p:txBody>
+      </p:sp>
+      <p:pic>
+        <p:nvPicPr>
+          <p:cNvPr id="9" name="Picture 8">
+            <a:extLst>
+              <a:ext uri="{FF2B5EF4-FFF2-40B4-BE49-F238E27FC236}">
+                <a16:creationId xmlns:a16="http://schemas.microsoft.com/office/drawing/2014/main" id="{67B534B4-A976-4DE1-95FD-7F4DEBFC84B9}"/>
+              </a:ext>
+            </a:extLst>
+          </p:cNvPr>
+          <p:cNvPicPr>
+            <a:picLocks noChangeAspect="1"/>
+          </p:cNvPicPr>
+          <p:nvPr/>
+        </p:nvPicPr>
+        <p:blipFill>
+          <a:blip r:embed="rId2"/>
+          <a:stretch>
+            <a:fillRect/>
+          </a:stretch>
+        </p:blipFill>
+        <p:spPr>
+          <a:xfrm>
+            <a:off x="2869607" y="-15380"/>
+            <a:ext cx="6452786" cy="6873380"/>
+          </a:xfrm>
+          <a:prstGeom prst="rect">
+            <a:avLst/>
+          </a:prstGeom>
+        </p:spPr>
+      </p:pic>
+    </p:spTree>
+    <p:extLst>
+      <p:ext uri="{BB962C8B-B14F-4D97-AF65-F5344CB8AC3E}">
+        <p14:creationId xmlns:p14="http://schemas.microsoft.com/office/powerpoint/2010/main" val="204521039"/>
+      </p:ext>
+    </p:extLst>
+  </p:cSld>
+  <p:clrMapOvr>
+    <a:masterClrMapping/>
+  </p:clrMapOvr>
+</p:sld>
+</file>
+
+<file path=ppt/slides/slide24.xml><?xml version="1.0" encoding="utf-8"?>
 <p:sld xmlns:a="http://schemas.openxmlformats.org/drawingml/2006/main" xmlns:r="http://schemas.openxmlformats.org/officeDocument/2006/relationships" xmlns:p="http://schemas.openxmlformats.org/presentationml/2006/main" show="0">
   <p:cSld>
     <p:spTree>
@@ -7502,13 +8189,13 @@
         </p:nvSpPr>
         <p:spPr>
           <a:xfrm>
-            <a:off x="1371600" y="1950057"/>
-            <a:ext cx="6595607" cy="2957885"/>
+            <a:off x="1371600" y="2093180"/>
+            <a:ext cx="6961367" cy="3250097"/>
           </a:xfrm>
         </p:spPr>
         <p:txBody>
           <a:bodyPr>
-            <a:normAutofit/>
+            <a:normAutofit fontScale="92500"/>
           </a:bodyPr>
           <a:lstStyle/>
           <a:p>
@@ -7541,6 +8228,12 @@
           <a:p>
             <a:r>
               <a:rPr lang="en-US" sz="2800" dirty="0"/>
+              <a:t>Online Prediction Intrusion Detection System</a:t>
+            </a:r>
+          </a:p>
+          <a:p>
+            <a:r>
+              <a:rPr lang="en-US" sz="2800" dirty="0"/>
               <a:t>Hybrid ML Solution on Mobile Devices</a:t>
             </a:r>
           </a:p>
@@ -7572,7 +8265,7 @@
           <a:p>
             <a:fld id="{69E57DC2-970A-4B3E-BB1C-7A09969E49DF}" type="slidenum">
               <a:rPr lang="en-US" smtClean="0"/>
-              <a:t>20</a:t>
+              <a:t>24</a:t>
             </a:fld>
             <a:endParaRPr lang="en-US" dirty="0"/>
           </a:p>
@@ -9081,14 +9774,14 @@
           <p:nvPr>
             <p:extLst>
               <p:ext uri="{D42A27DB-BD31-4B8C-83A1-F6EECF244321}">
-                <p14:modId xmlns:p14="http://schemas.microsoft.com/office/powerpoint/2010/main" val="1575840038"/>
+                <p14:modId xmlns:p14="http://schemas.microsoft.com/office/powerpoint/2010/main" val="3038120142"/>
               </p:ext>
             </p:extLst>
           </p:nvPr>
         </p:nvGraphicFramePr>
         <p:xfrm>
           <a:off x="970059" y="3087210"/>
-          <a:ext cx="4389120" cy="2123440"/>
+          <a:ext cx="4389120" cy="1854200"/>
         </p:xfrm>
         <a:graphic>
           <a:graphicData uri="http://schemas.openxmlformats.org/drawingml/2006/table">
@@ -9199,7 +9892,7 @@
                     <a:p>
                       <a:r>
                         <a:rPr lang="en-US" dirty="0"/>
-                        <a:t>38</a:t>
+                        <a:t>22</a:t>
                       </a:r>
                     </a:p>
                   </a:txBody>
@@ -9245,7 +9938,7 @@
                     <a:p>
                       <a:r>
                         <a:rPr lang="en-US" dirty="0"/>
-                        <a:t>38</a:t>
+                        <a:t>22</a:t>
                       </a:r>
                     </a:p>
                   </a:txBody>
@@ -9291,7 +9984,7 @@
                     <a:p>
                       <a:r>
                         <a:rPr lang="en-US" dirty="0"/>
-                        <a:t>38</a:t>
+                        <a:t>22</a:t>
                       </a:r>
                     </a:p>
                   </a:txBody>
@@ -9311,7 +10004,7 @@
                     <a:p>
                       <a:r>
                         <a:rPr lang="en-US" dirty="0"/>
-                        <a:t>CTU-13 (CTU-UNB)</a:t>
+                        <a:t>ISCX</a:t>
                       </a:r>
                     </a:p>
                   </a:txBody>
@@ -9324,7 +10017,7 @@
                     <a:p>
                       <a:r>
                         <a:rPr lang="en-US" dirty="0"/>
-                        <a:t>2</a:t>
+                        <a:t>9</a:t>
                       </a:r>
                     </a:p>
                   </a:txBody>
@@ -9337,7 +10030,7 @@
                     <a:p>
                       <a:r>
                         <a:rPr lang="en-US" dirty="0"/>
-                        <a:t>13</a:t>
+                        <a:t>14</a:t>
                       </a:r>
                     </a:p>
                   </a:txBody>
@@ -9532,11 +10225,19 @@
           </a:p>
           <a:p>
             <a:r>
-              <a:rPr lang="en-US" u="sng" dirty="0"/>
+              <a:rPr lang="en-US" u="sng" dirty="0">
+                <a:solidFill>
+                  <a:srgbClr val="FF0000"/>
+                </a:solidFill>
+              </a:rPr>
               <a:t>Accuracy</a:t>
             </a:r>
             <a:r>
-              <a:rPr lang="en-US" dirty="0"/>
+              <a:rPr lang="en-US" dirty="0">
+                <a:solidFill>
+                  <a:srgbClr val="FF0000"/>
+                </a:solidFill>
+              </a:rPr>
               <a:t>: 97.09%</a:t>
             </a:r>
           </a:p>
@@ -10060,10 +10761,10 @@
       </p:sp>
       <p:pic>
         <p:nvPicPr>
-          <p:cNvPr id="12" name="Picture 11" descr="A close up of a device&#10;&#10;Description automatically generated">
-            <a:extLst>
-              <a:ext uri="{FF2B5EF4-FFF2-40B4-BE49-F238E27FC236}">
-                <a16:creationId xmlns:a16="http://schemas.microsoft.com/office/drawing/2014/main" id="{F2C860B0-D41B-4080-8BB3-683A8D78DFAF}"/>
+          <p:cNvPr id="14" name="Picture 13" descr="Diagram&#10;&#10;Description automatically generated">
+            <a:extLst>
+              <a:ext uri="{FF2B5EF4-FFF2-40B4-BE49-F238E27FC236}">
+                <a16:creationId xmlns:a16="http://schemas.microsoft.com/office/drawing/2014/main" id="{C4C63296-E662-419D-80DD-6A7B99A025EF}"/>
               </a:ext>
             </a:extLst>
           </p:cNvPr>
@@ -10080,8 +10781,8 @@
         </p:blipFill>
         <p:spPr>
           <a:xfrm>
-            <a:off x="1080464" y="1550505"/>
-            <a:ext cx="10868613" cy="4106402"/>
+            <a:off x="703474" y="1498861"/>
+            <a:ext cx="11488526" cy="3650152"/>
           </a:xfrm>
           <a:prstGeom prst="rect">
             <a:avLst/>
@@ -10146,7 +10847,7 @@
           <a:p>
             <a:r>
               <a:rPr lang="en-US" dirty="0"/>
-              <a:t>Data Collection</a:t>
+              <a:t>Input</a:t>
             </a:r>
           </a:p>
         </p:txBody>

</xml_diff>